<commit_message>
Update Mesure des défauts de l'oeil v3.pptx
</commit_message>
<xml_diff>
--- a/Présentation/Mesure des défauts de l'oeil v3.pptx
+++ b/Présentation/Mesure des défauts de l'oeil v3.pptx
@@ -13,17 +13,18 @@
     <p:sldId id="258" r:id="rId7"/>
     <p:sldId id="281" r:id="rId8"/>
     <p:sldId id="278" r:id="rId9"/>
-    <p:sldId id="263" r:id="rId10"/>
-    <p:sldId id="280" r:id="rId11"/>
-    <p:sldId id="265" r:id="rId12"/>
-    <p:sldId id="270" r:id="rId13"/>
+    <p:sldId id="283" r:id="rId10"/>
+    <p:sldId id="263" r:id="rId11"/>
+    <p:sldId id="280" r:id="rId12"/>
+    <p:sldId id="265" r:id="rId13"/>
     <p:sldId id="267" r:id="rId14"/>
-    <p:sldId id="282" r:id="rId15"/>
-    <p:sldId id="269" r:id="rId16"/>
-    <p:sldId id="271" r:id="rId17"/>
-    <p:sldId id="268" r:id="rId18"/>
-    <p:sldId id="272" r:id="rId19"/>
-    <p:sldId id="279" r:id="rId20"/>
+    <p:sldId id="270" r:id="rId15"/>
+    <p:sldId id="282" r:id="rId16"/>
+    <p:sldId id="269" r:id="rId17"/>
+    <p:sldId id="271" r:id="rId18"/>
+    <p:sldId id="268" r:id="rId19"/>
+    <p:sldId id="272" r:id="rId20"/>
+    <p:sldId id="279" r:id="rId21"/>
   </p:sldIdLst>
   <p:sldSz cx="12192000" cy="6858000"/>
   <p:notesSz cx="6858000" cy="9144000"/>
@@ -6034,12 +6035,47 @@
           <a:chExt cx="0" cy="0"/>
         </a:xfrm>
       </p:grpSpPr>
+      <p:pic>
+        <p:nvPicPr>
+          <p:cNvPr id="5" name="Image 4">
+            <a:extLst>
+              <a:ext uri="{FF2B5EF4-FFF2-40B4-BE49-F238E27FC236}">
+                <a16:creationId xmlns:a16="http://schemas.microsoft.com/office/drawing/2014/main" id="{F6A54EA3-A0F6-192E-FCA9-BAF8EEC62E36}"/>
+              </a:ext>
+            </a:extLst>
+          </p:cNvPr>
+          <p:cNvPicPr>
+            <a:picLocks noChangeAspect="1"/>
+          </p:cNvPicPr>
+          <p:nvPr/>
+        </p:nvPicPr>
+        <p:blipFill rotWithShape="1">
+          <a:blip r:embed="rId2">
+            <a:extLst>
+              <a:ext uri="{28A0092B-C50C-407E-A947-70E740481C1C}">
+                <a14:useLocalDpi xmlns:a14="http://schemas.microsoft.com/office/drawing/2010/main" val="0"/>
+              </a:ext>
+            </a:extLst>
+          </a:blip>
+          <a:srcRect l="12400" r="9829" b="10898"/>
+          <a:stretch/>
+        </p:blipFill>
+        <p:spPr>
+          <a:xfrm>
+            <a:off x="6121579" y="2132228"/>
+            <a:ext cx="3220279" cy="2767110"/>
+          </a:xfrm>
+          <a:prstGeom prst="rect">
+            <a:avLst/>
+          </a:prstGeom>
+        </p:spPr>
+      </p:pic>
       <p:sp>
         <p:nvSpPr>
           <p:cNvPr id="2" name="Titre 1">
             <a:extLst>
               <a:ext uri="{FF2B5EF4-FFF2-40B4-BE49-F238E27FC236}">
-                <a16:creationId xmlns:a16="http://schemas.microsoft.com/office/drawing/2014/main" id="{406A12DA-9A2D-4669-8BCC-6EF19F2F83DB}"/>
+                <a16:creationId xmlns:a16="http://schemas.microsoft.com/office/drawing/2014/main" id="{129CD821-680E-497C-B441-FD2D5F7803AA}"/>
               </a:ext>
             </a:extLst>
           </p:cNvPr>
@@ -6050,78 +6086,30 @@
             <p:ph type="title"/>
           </p:nvPr>
         </p:nvSpPr>
-        <p:spPr/>
-        <p:txBody>
-          <a:bodyPr>
-            <a:normAutofit/>
-          </a:bodyPr>
-          <a:lstStyle/>
-          <a:p>
+        <p:spPr>
+          <a:xfrm>
+            <a:off x="0" y="577512"/>
+            <a:ext cx="8596668" cy="1320800"/>
+          </a:xfrm>
+        </p:spPr>
+        <p:txBody>
+          <a:bodyPr/>
+          <a:lstStyle/>
+          <a:p>
+            <a:pPr algn="ctr"/>
             <a:r>
               <a:rPr lang="fr-FR" dirty="0"/>
-              <a:t>II.  </a:t>
-            </a:r>
-            <a:r>
-              <a:rPr lang="fr-FR" sz="3600" dirty="0"/>
-              <a:t>Mesure de la déformation d’un front d’onde type Shack-Hartmann</a:t>
-            </a:r>
-            <a:endParaRPr lang="fr-FR" dirty="0"/>
+              <a:t>b) Simulation : estimation du temps de parcours</a:t>
+            </a:r>
           </a:p>
         </p:txBody>
       </p:sp>
       <p:pic>
         <p:nvPicPr>
-          <p:cNvPr id="5122" name="Picture 2">
+          <p:cNvPr id="4098" name="Picture 2">
             <a:extLst>
               <a:ext uri="{FF2B5EF4-FFF2-40B4-BE49-F238E27FC236}">
-                <a16:creationId xmlns:a16="http://schemas.microsoft.com/office/drawing/2014/main" id="{BD846EA8-B6FA-480D-ADB8-64D9AEE0052A}"/>
-              </a:ext>
-            </a:extLst>
-          </p:cNvPr>
-          <p:cNvPicPr>
-            <a:picLocks noChangeAspect="1" noChangeArrowheads="1"/>
-          </p:cNvPicPr>
-          <p:nvPr/>
-        </p:nvPicPr>
-        <p:blipFill>
-          <a:blip r:embed="rId2">
-            <a:extLst>
-              <a:ext uri="{28A0092B-C50C-407E-A947-70E740481C1C}">
-                <a14:useLocalDpi xmlns:a14="http://schemas.microsoft.com/office/drawing/2010/main" val="0"/>
-              </a:ext>
-            </a:extLst>
-          </a:blip>
-          <a:srcRect/>
-          <a:stretch>
-            <a:fillRect/>
-          </a:stretch>
-        </p:blipFill>
-        <p:spPr bwMode="auto">
-          <a:xfrm>
-            <a:off x="677334" y="2433808"/>
-            <a:ext cx="3712723" cy="2796145"/>
-          </a:xfrm>
-          <a:prstGeom prst="rect">
-            <a:avLst/>
-          </a:prstGeom>
-          <a:noFill/>
-          <a:extLst>
-            <a:ext uri="{909E8E84-426E-40DD-AFC4-6F175D3DCCD1}">
-              <a14:hiddenFill xmlns:a14="http://schemas.microsoft.com/office/drawing/2010/main">
-                <a:solidFill>
-                  <a:srgbClr val="FFFFFF"/>
-                </a:solidFill>
-              </a14:hiddenFill>
-            </a:ext>
-          </a:extLst>
-        </p:spPr>
-      </p:pic>
-      <p:pic>
-        <p:nvPicPr>
-          <p:cNvPr id="5124" name="Picture 4">
-            <a:extLst>
-              <a:ext uri="{FF2B5EF4-FFF2-40B4-BE49-F238E27FC236}">
-                <a16:creationId xmlns:a16="http://schemas.microsoft.com/office/drawing/2014/main" id="{6E16F791-7F51-4997-9148-410C1DCDF900}"/>
+                <a16:creationId xmlns:a16="http://schemas.microsoft.com/office/drawing/2014/main" id="{8BD04069-F990-489E-B01A-30B5EACBF7B0}"/>
               </a:ext>
             </a:extLst>
           </p:cNvPr>
@@ -6145,8 +6133,8 @@
         </p:blipFill>
         <p:spPr bwMode="auto">
           <a:xfrm>
-            <a:off x="4858937" y="2950814"/>
-            <a:ext cx="4216970" cy="1762135"/>
+            <a:off x="1270477" y="2164316"/>
+            <a:ext cx="4281873" cy="3224842"/>
           </a:xfrm>
           <a:prstGeom prst="rect">
             <a:avLst/>
@@ -6165,10 +6153,10 @@
       </p:pic>
       <p:sp>
         <p:nvSpPr>
-          <p:cNvPr id="7" name="ZoneTexte 6">
+          <p:cNvPr id="10" name="ZoneTexte 9">
             <a:extLst>
               <a:ext uri="{FF2B5EF4-FFF2-40B4-BE49-F238E27FC236}">
-                <a16:creationId xmlns:a16="http://schemas.microsoft.com/office/drawing/2014/main" id="{06C8B730-B79F-4879-89D9-36F122E34983}"/>
+                <a16:creationId xmlns:a16="http://schemas.microsoft.com/office/drawing/2014/main" id="{01ABE1BA-29E6-408B-BAD3-CC9414ACBA1F}"/>
               </a:ext>
             </a:extLst>
           </p:cNvPr>
@@ -6177,8 +6165,8 @@
         </p:nvSpPr>
         <p:spPr>
           <a:xfrm>
-            <a:off x="4460132" y="4755002"/>
-            <a:ext cx="2650787" cy="861774"/>
+            <a:off x="5412800" y="4993611"/>
+            <a:ext cx="4612613" cy="1477328"/>
           </a:xfrm>
           <a:prstGeom prst="rect">
             <a:avLst/>
@@ -6200,54 +6188,29 @@
               </a:spcAft>
             </a:pPr>
             <a:r>
-              <a:rPr lang="fr-FR" sz="1400" b="0" i="0" u="none" strike="noStrike" dirty="0">
+              <a:rPr lang="fr-FR" sz="1800" b="1" i="0" u="none" strike="noStrike" dirty="0">
                 <a:solidFill>
                   <a:srgbClr val="000000"/>
                 </a:solidFill>
                 <a:effectLst/>
                 <a:latin typeface="Roboto" panose="02000000000000000000" pitchFamily="2" charset="0"/>
               </a:rPr>
-              <a:t>Positions idéales des points</a:t>
-            </a:r>
-            <a:endParaRPr lang="fr-FR" sz="1400" b="0" dirty="0">
+              <a:t>Front d’onde après traversé de la cuve</a:t>
+            </a:r>
+            <a:r>
+              <a:rPr lang="fr-FR" sz="1800" b="0" i="0" u="none" strike="noStrike" dirty="0">
+                <a:solidFill>
+                  <a:srgbClr val="000000"/>
+                </a:solidFill>
+                <a:effectLst/>
+                <a:latin typeface="Roboto" panose="02000000000000000000" pitchFamily="2" charset="0"/>
+              </a:rPr>
+              <a:t> </a:t>
+            </a:r>
+            <a:endParaRPr lang="fr-FR" b="0" dirty="0">
               <a:effectLst/>
             </a:endParaRPr>
           </a:p>
-          <a:p>
-            <a:br>
-              <a:rPr lang="fr-FR" dirty="0"/>
-            </a:br>
-            <a:endParaRPr lang="fr-FR" dirty="0"/>
-          </a:p>
-        </p:txBody>
-      </p:sp>
-      <p:sp>
-        <p:nvSpPr>
-          <p:cNvPr id="8" name="ZoneTexte 7">
-            <a:extLst>
-              <a:ext uri="{FF2B5EF4-FFF2-40B4-BE49-F238E27FC236}">
-                <a16:creationId xmlns:a16="http://schemas.microsoft.com/office/drawing/2014/main" id="{28F53D53-C429-4D53-94FC-85FBF400D6A2}"/>
-              </a:ext>
-            </a:extLst>
-          </p:cNvPr>
-          <p:cNvSpPr txBox="1"/>
-          <p:nvPr/>
-        </p:nvSpPr>
-        <p:spPr>
-          <a:xfrm>
-            <a:off x="6901746" y="4755002"/>
-            <a:ext cx="2650787" cy="861774"/>
-          </a:xfrm>
-          <a:prstGeom prst="rect">
-            <a:avLst/>
-          </a:prstGeom>
-          <a:noFill/>
-        </p:spPr>
-        <p:txBody>
-          <a:bodyPr wrap="square">
-            <a:spAutoFit/>
-          </a:bodyPr>
-          <a:lstStyle/>
           <a:p>
             <a:pPr algn="ctr" rtl="0">
               <a:spcBef>
@@ -6258,20 +6221,61 @@
               </a:spcAft>
             </a:pPr>
             <a:r>
-              <a:rPr lang="fr-FR" sz="1400" b="0" i="0" u="none" strike="noStrike" dirty="0">
+              <a:rPr lang="fr-FR" sz="1800" b="0" i="0" u="none" strike="noStrike" dirty="0">
                 <a:solidFill>
                   <a:srgbClr val="000000"/>
                 </a:solidFill>
                 <a:effectLst/>
                 <a:latin typeface="Roboto" panose="02000000000000000000" pitchFamily="2" charset="0"/>
               </a:rPr>
-              <a:t>Positions réelles des points</a:t>
-            </a:r>
-            <a:endParaRPr lang="fr-FR" sz="1400" b="0" dirty="0">
-              <a:effectLst/>
-            </a:endParaRPr>
-          </a:p>
-          <a:p>
+              <a:t>(décalage en fonction du temps</a:t>
+            </a:r>
+            <a:r>
+              <a:rPr lang="fr-FR" dirty="0">
+                <a:solidFill>
+                  <a:srgbClr val="000000"/>
+                </a:solidFill>
+                <a:latin typeface="Roboto" panose="02000000000000000000" pitchFamily="2" charset="0"/>
+              </a:rPr>
+              <a:t>) </a:t>
+            </a:r>
+          </a:p>
+          <a:p>
+            <a:pPr algn="ctr" rtl="0">
+              <a:spcBef>
+                <a:spcPts val="0"/>
+              </a:spcBef>
+              <a:spcAft>
+                <a:spcPts val="0"/>
+              </a:spcAft>
+            </a:pPr>
+            <a:r>
+              <a:rPr lang="fr-FR" dirty="0">
+                <a:solidFill>
+                  <a:srgbClr val="000000"/>
+                </a:solidFill>
+                <a:latin typeface="Roboto" panose="02000000000000000000" pitchFamily="2" charset="0"/>
+              </a:rPr>
+              <a:t>Rectangle </a:t>
+            </a:r>
+            <a:r>
+              <a:rPr lang="fr-FR" dirty="0"/>
+              <a:t>rouge pour ce qui </a:t>
+            </a:r>
+          </a:p>
+          <a:p>
+            <a:pPr algn="ctr" rtl="0">
+              <a:spcBef>
+                <a:spcPts val="0"/>
+              </a:spcBef>
+              <a:spcAft>
+                <a:spcPts val="0"/>
+              </a:spcAft>
+            </a:pPr>
+            <a:r>
+              <a:rPr lang="fr-FR" dirty="0"/>
+              <a:t>nous intéresse</a:t>
+            </a:r>
             <a:br>
               <a:rPr lang="fr-FR" dirty="0"/>
             </a:br>
@@ -6279,10 +6283,453 @@
           </a:p>
         </p:txBody>
       </p:sp>
+      <p:sp>
+        <p:nvSpPr>
+          <p:cNvPr id="14" name="ZoneTexte 13">
+            <a:extLst>
+              <a:ext uri="{FF2B5EF4-FFF2-40B4-BE49-F238E27FC236}">
+                <a16:creationId xmlns:a16="http://schemas.microsoft.com/office/drawing/2014/main" id="{EB2B03C1-BB7A-420F-B26F-F4E91329DBA1}"/>
+              </a:ext>
+            </a:extLst>
+          </p:cNvPr>
+          <p:cNvSpPr txBox="1"/>
+          <p:nvPr/>
+        </p:nvSpPr>
+        <p:spPr>
+          <a:xfrm>
+            <a:off x="4822281" y="1645765"/>
+            <a:ext cx="6099242" cy="923330"/>
+          </a:xfrm>
+          <a:prstGeom prst="rect">
+            <a:avLst/>
+          </a:prstGeom>
+          <a:noFill/>
+        </p:spPr>
+        <p:txBody>
+          <a:bodyPr wrap="square">
+            <a:spAutoFit/>
+          </a:bodyPr>
+          <a:lstStyle/>
+          <a:p>
+            <a:pPr algn="ctr" rtl="0">
+              <a:spcBef>
+                <a:spcPts val="0"/>
+              </a:spcBef>
+              <a:spcAft>
+                <a:spcPts val="0"/>
+              </a:spcAft>
+            </a:pPr>
+            <a:r>
+              <a:rPr lang="fr-FR" sz="1800" b="1" i="0" u="none" strike="noStrike" dirty="0">
+                <a:solidFill>
+                  <a:srgbClr val="000000"/>
+                </a:solidFill>
+                <a:effectLst/>
+                <a:latin typeface="Roboto" panose="02000000000000000000" pitchFamily="2" charset="0"/>
+              </a:rPr>
+              <a:t>Simulation des inhomogénéités</a:t>
+            </a:r>
+            <a:endParaRPr lang="fr-FR" b="0" dirty="0">
+              <a:effectLst/>
+            </a:endParaRPr>
+          </a:p>
+          <a:p>
+            <a:br>
+              <a:rPr lang="fr-FR" dirty="0"/>
+            </a:br>
+            <a:endParaRPr lang="fr-FR" dirty="0"/>
+          </a:p>
+        </p:txBody>
+      </p:sp>
+      <p:cxnSp>
+        <p:nvCxnSpPr>
+          <p:cNvPr id="4" name="Connecteur droit avec flèche 3">
+            <a:extLst>
+              <a:ext uri="{FF2B5EF4-FFF2-40B4-BE49-F238E27FC236}">
+                <a16:creationId xmlns:a16="http://schemas.microsoft.com/office/drawing/2014/main" id="{F4C491B0-E35B-4F94-A991-F0C6E501C36D}"/>
+              </a:ext>
+            </a:extLst>
+          </p:cNvPr>
+          <p:cNvCxnSpPr>
+            <a:cxnSpLocks/>
+          </p:cNvCxnSpPr>
+          <p:nvPr/>
+        </p:nvCxnSpPr>
+        <p:spPr>
+          <a:xfrm>
+            <a:off x="184826" y="2481005"/>
+            <a:ext cx="904672" cy="0"/>
+          </a:xfrm>
+          <a:prstGeom prst="straightConnector1">
+            <a:avLst/>
+          </a:prstGeom>
+          <a:ln>
+            <a:tailEnd type="triangle"/>
+          </a:ln>
+        </p:spPr>
+        <p:style>
+          <a:lnRef idx="2">
+            <a:schemeClr val="dk1"/>
+          </a:lnRef>
+          <a:fillRef idx="0">
+            <a:schemeClr val="dk1"/>
+          </a:fillRef>
+          <a:effectRef idx="1">
+            <a:schemeClr val="dk1"/>
+          </a:effectRef>
+          <a:fontRef idx="minor">
+            <a:schemeClr val="tx1"/>
+          </a:fontRef>
+        </p:style>
+      </p:cxnSp>
+      <p:cxnSp>
+        <p:nvCxnSpPr>
+          <p:cNvPr id="12" name="Connecteur droit avec flèche 11">
+            <a:extLst>
+              <a:ext uri="{FF2B5EF4-FFF2-40B4-BE49-F238E27FC236}">
+                <a16:creationId xmlns:a16="http://schemas.microsoft.com/office/drawing/2014/main" id="{94E528F4-DCFF-4522-8C7B-FA163DE5D016}"/>
+              </a:ext>
+            </a:extLst>
+          </p:cNvPr>
+          <p:cNvCxnSpPr>
+            <a:cxnSpLocks/>
+          </p:cNvCxnSpPr>
+          <p:nvPr/>
+        </p:nvCxnSpPr>
+        <p:spPr>
+          <a:xfrm>
+            <a:off x="197437" y="4573901"/>
+            <a:ext cx="904672" cy="0"/>
+          </a:xfrm>
+          <a:prstGeom prst="straightConnector1">
+            <a:avLst/>
+          </a:prstGeom>
+          <a:ln>
+            <a:tailEnd type="triangle"/>
+          </a:ln>
+        </p:spPr>
+        <p:style>
+          <a:lnRef idx="2">
+            <a:schemeClr val="dk1"/>
+          </a:lnRef>
+          <a:fillRef idx="0">
+            <a:schemeClr val="dk1"/>
+          </a:fillRef>
+          <a:effectRef idx="1">
+            <a:schemeClr val="dk1"/>
+          </a:effectRef>
+          <a:fontRef idx="minor">
+            <a:schemeClr val="tx1"/>
+          </a:fontRef>
+        </p:style>
+      </p:cxnSp>
+      <p:cxnSp>
+        <p:nvCxnSpPr>
+          <p:cNvPr id="13" name="Connecteur droit avec flèche 12">
+            <a:extLst>
+              <a:ext uri="{FF2B5EF4-FFF2-40B4-BE49-F238E27FC236}">
+                <a16:creationId xmlns:a16="http://schemas.microsoft.com/office/drawing/2014/main" id="{B2636701-50CB-4925-B2C8-BE24D92FD6F2}"/>
+              </a:ext>
+            </a:extLst>
+          </p:cNvPr>
+          <p:cNvCxnSpPr>
+            <a:cxnSpLocks/>
+          </p:cNvCxnSpPr>
+          <p:nvPr/>
+        </p:nvCxnSpPr>
+        <p:spPr>
+          <a:xfrm>
+            <a:off x="184826" y="2973873"/>
+            <a:ext cx="904672" cy="0"/>
+          </a:xfrm>
+          <a:prstGeom prst="straightConnector1">
+            <a:avLst/>
+          </a:prstGeom>
+          <a:ln>
+            <a:tailEnd type="triangle"/>
+          </a:ln>
+        </p:spPr>
+        <p:style>
+          <a:lnRef idx="2">
+            <a:schemeClr val="dk1"/>
+          </a:lnRef>
+          <a:fillRef idx="0">
+            <a:schemeClr val="dk1"/>
+          </a:fillRef>
+          <a:effectRef idx="1">
+            <a:schemeClr val="dk1"/>
+          </a:effectRef>
+          <a:fontRef idx="minor">
+            <a:schemeClr val="tx1"/>
+          </a:fontRef>
+        </p:style>
+      </p:cxnSp>
+      <p:cxnSp>
+        <p:nvCxnSpPr>
+          <p:cNvPr id="15" name="Connecteur droit avec flèche 14">
+            <a:extLst>
+              <a:ext uri="{FF2B5EF4-FFF2-40B4-BE49-F238E27FC236}">
+                <a16:creationId xmlns:a16="http://schemas.microsoft.com/office/drawing/2014/main" id="{CED1DB18-CA05-48EB-A910-D46C1438EF0E}"/>
+              </a:ext>
+            </a:extLst>
+          </p:cNvPr>
+          <p:cNvCxnSpPr>
+            <a:cxnSpLocks/>
+          </p:cNvCxnSpPr>
+          <p:nvPr/>
+        </p:nvCxnSpPr>
+        <p:spPr>
+          <a:xfrm>
+            <a:off x="184826" y="5035376"/>
+            <a:ext cx="904672" cy="0"/>
+          </a:xfrm>
+          <a:prstGeom prst="straightConnector1">
+            <a:avLst/>
+          </a:prstGeom>
+          <a:ln>
+            <a:tailEnd type="triangle"/>
+          </a:ln>
+        </p:spPr>
+        <p:style>
+          <a:lnRef idx="2">
+            <a:schemeClr val="dk1"/>
+          </a:lnRef>
+          <a:fillRef idx="0">
+            <a:schemeClr val="dk1"/>
+          </a:fillRef>
+          <a:effectRef idx="1">
+            <a:schemeClr val="dk1"/>
+          </a:effectRef>
+          <a:fontRef idx="minor">
+            <a:schemeClr val="tx1"/>
+          </a:fontRef>
+        </p:style>
+      </p:cxnSp>
+      <p:cxnSp>
+        <p:nvCxnSpPr>
+          <p:cNvPr id="16" name="Connecteur droit avec flèche 15">
+            <a:extLst>
+              <a:ext uri="{FF2B5EF4-FFF2-40B4-BE49-F238E27FC236}">
+                <a16:creationId xmlns:a16="http://schemas.microsoft.com/office/drawing/2014/main" id="{DCE66910-17AA-4E24-AA61-4EFB40B09DEB}"/>
+              </a:ext>
+            </a:extLst>
+          </p:cNvPr>
+          <p:cNvCxnSpPr>
+            <a:cxnSpLocks/>
+          </p:cNvCxnSpPr>
+          <p:nvPr/>
+        </p:nvCxnSpPr>
+        <p:spPr>
+          <a:xfrm>
+            <a:off x="184826" y="3479711"/>
+            <a:ext cx="904672" cy="0"/>
+          </a:xfrm>
+          <a:prstGeom prst="straightConnector1">
+            <a:avLst/>
+          </a:prstGeom>
+          <a:ln>
+            <a:tailEnd type="triangle"/>
+          </a:ln>
+        </p:spPr>
+        <p:style>
+          <a:lnRef idx="2">
+            <a:schemeClr val="dk1"/>
+          </a:lnRef>
+          <a:fillRef idx="0">
+            <a:schemeClr val="dk1"/>
+          </a:fillRef>
+          <a:effectRef idx="1">
+            <a:schemeClr val="dk1"/>
+          </a:effectRef>
+          <a:fontRef idx="minor">
+            <a:schemeClr val="tx1"/>
+          </a:fontRef>
+        </p:style>
+      </p:cxnSp>
+      <p:cxnSp>
+        <p:nvCxnSpPr>
+          <p:cNvPr id="18" name="Connecteur droit avec flèche 17">
+            <a:extLst>
+              <a:ext uri="{FF2B5EF4-FFF2-40B4-BE49-F238E27FC236}">
+                <a16:creationId xmlns:a16="http://schemas.microsoft.com/office/drawing/2014/main" id="{81CE1A96-FDCE-4A1C-A01B-00803CCD3408}"/>
+              </a:ext>
+            </a:extLst>
+          </p:cNvPr>
+          <p:cNvCxnSpPr>
+            <a:cxnSpLocks/>
+          </p:cNvCxnSpPr>
+          <p:nvPr/>
+        </p:nvCxnSpPr>
+        <p:spPr>
+          <a:xfrm>
+            <a:off x="197437" y="4043916"/>
+            <a:ext cx="904672" cy="0"/>
+          </a:xfrm>
+          <a:prstGeom prst="straightConnector1">
+            <a:avLst/>
+          </a:prstGeom>
+          <a:ln>
+            <a:tailEnd type="triangle"/>
+          </a:ln>
+        </p:spPr>
+        <p:style>
+          <a:lnRef idx="2">
+            <a:schemeClr val="dk1"/>
+          </a:lnRef>
+          <a:fillRef idx="0">
+            <a:schemeClr val="dk1"/>
+          </a:fillRef>
+          <a:effectRef idx="1">
+            <a:schemeClr val="dk1"/>
+          </a:effectRef>
+          <a:fontRef idx="minor">
+            <a:schemeClr val="tx1"/>
+          </a:fontRef>
+        </p:style>
+      </p:cxnSp>
+      <p:sp>
+        <p:nvSpPr>
+          <p:cNvPr id="6" name="ZoneTexte 5">
+            <a:extLst>
+              <a:ext uri="{FF2B5EF4-FFF2-40B4-BE49-F238E27FC236}">
+                <a16:creationId xmlns:a16="http://schemas.microsoft.com/office/drawing/2014/main" id="{AB1EE0DC-8192-42DF-B484-F7E391ADD307}"/>
+              </a:ext>
+            </a:extLst>
+          </p:cNvPr>
+          <p:cNvSpPr txBox="1"/>
+          <p:nvPr/>
+        </p:nvSpPr>
+        <p:spPr>
+          <a:xfrm>
+            <a:off x="0" y="1762896"/>
+            <a:ext cx="2016899" cy="369332"/>
+          </a:xfrm>
+          <a:prstGeom prst="rect">
+            <a:avLst/>
+          </a:prstGeom>
+          <a:noFill/>
+        </p:spPr>
+        <p:txBody>
+          <a:bodyPr wrap="none" rtlCol="0">
+            <a:spAutoFit/>
+          </a:bodyPr>
+          <a:lstStyle/>
+          <a:p>
+            <a:r>
+              <a:rPr lang="fr-FR" dirty="0"/>
+              <a:t>Lumière en phase</a:t>
+            </a:r>
+          </a:p>
+        </p:txBody>
+      </p:sp>
+      <p:sp>
+        <p:nvSpPr>
+          <p:cNvPr id="3" name="Rectangle 2">
+            <a:extLst>
+              <a:ext uri="{FF2B5EF4-FFF2-40B4-BE49-F238E27FC236}">
+                <a16:creationId xmlns:a16="http://schemas.microsoft.com/office/drawing/2014/main" id="{A6EC08AF-08A1-5F14-A178-15F7E872CBFC}"/>
+              </a:ext>
+            </a:extLst>
+          </p:cNvPr>
+          <p:cNvSpPr/>
+          <p:nvPr/>
+        </p:nvSpPr>
+        <p:spPr>
+          <a:xfrm>
+            <a:off x="1292087" y="2464342"/>
+            <a:ext cx="4247652" cy="2624790"/>
+          </a:xfrm>
+          <a:prstGeom prst="rect">
+            <a:avLst/>
+          </a:prstGeom>
+          <a:noFill/>
+          <a:ln w="38100">
+            <a:solidFill>
+              <a:srgbClr val="FF0000"/>
+            </a:solidFill>
+          </a:ln>
+        </p:spPr>
+        <p:style>
+          <a:lnRef idx="2">
+            <a:schemeClr val="accent1">
+              <a:shade val="50000"/>
+            </a:schemeClr>
+          </a:lnRef>
+          <a:fillRef idx="1">
+            <a:schemeClr val="accent1"/>
+          </a:fillRef>
+          <a:effectRef idx="0">
+            <a:schemeClr val="accent1"/>
+          </a:effectRef>
+          <a:fontRef idx="minor">
+            <a:schemeClr val="lt1"/>
+          </a:fontRef>
+        </p:style>
+        <p:txBody>
+          <a:bodyPr rtlCol="0" anchor="ctr"/>
+          <a:lstStyle/>
+          <a:p>
+            <a:pPr algn="ctr"/>
+            <a:endParaRPr lang="fr-FR"/>
+          </a:p>
+        </p:txBody>
+      </p:sp>
+      <p:sp>
+        <p:nvSpPr>
+          <p:cNvPr id="7" name="Rectangle 6">
+            <a:extLst>
+              <a:ext uri="{FF2B5EF4-FFF2-40B4-BE49-F238E27FC236}">
+                <a16:creationId xmlns:a16="http://schemas.microsoft.com/office/drawing/2014/main" id="{1784BD82-72A9-0EB1-A846-DCA36B0E988E}"/>
+              </a:ext>
+            </a:extLst>
+          </p:cNvPr>
+          <p:cNvSpPr/>
+          <p:nvPr/>
+        </p:nvSpPr>
+        <p:spPr>
+          <a:xfrm>
+            <a:off x="6108968" y="2746254"/>
+            <a:ext cx="3220278" cy="1938130"/>
+          </a:xfrm>
+          <a:prstGeom prst="rect">
+            <a:avLst/>
+          </a:prstGeom>
+          <a:noFill/>
+          <a:ln w="38100">
+            <a:solidFill>
+              <a:srgbClr val="FF0000"/>
+            </a:solidFill>
+          </a:ln>
+        </p:spPr>
+        <p:style>
+          <a:lnRef idx="2">
+            <a:schemeClr val="accent1">
+              <a:shade val="50000"/>
+            </a:schemeClr>
+          </a:lnRef>
+          <a:fillRef idx="1">
+            <a:schemeClr val="accent1"/>
+          </a:fillRef>
+          <a:effectRef idx="0">
+            <a:schemeClr val="accent1"/>
+          </a:effectRef>
+          <a:fontRef idx="minor">
+            <a:schemeClr val="lt1"/>
+          </a:fontRef>
+        </p:style>
+        <p:txBody>
+          <a:bodyPr rtlCol="0" anchor="ctr"/>
+          <a:lstStyle/>
+          <a:p>
+            <a:pPr algn="ctr"/>
+            <a:endParaRPr lang="fr-FR"/>
+          </a:p>
+        </p:txBody>
+      </p:sp>
     </p:spTree>
     <p:extLst>
       <p:ext uri="{BB962C8B-B14F-4D97-AF65-F5344CB8AC3E}">
-        <p14:creationId xmlns:p14="http://schemas.microsoft.com/office/powerpoint/2010/main" val="1797730123"/>
+        <p14:creationId xmlns:p14="http://schemas.microsoft.com/office/powerpoint/2010/main" val="2914263296"/>
       </p:ext>
     </p:extLst>
   </p:cSld>
@@ -6309,42 +6756,12 @@
           <a:chExt cx="0" cy="0"/>
         </a:xfrm>
       </p:grpSpPr>
-      <p:pic>
-        <p:nvPicPr>
-          <p:cNvPr id="3" name="Image 2">
+      <p:sp>
+        <p:nvSpPr>
+          <p:cNvPr id="2" name="Titre 1">
             <a:extLst>
               <a:ext uri="{FF2B5EF4-FFF2-40B4-BE49-F238E27FC236}">
-                <a16:creationId xmlns:a16="http://schemas.microsoft.com/office/drawing/2014/main" id="{829C6A24-02E9-9C61-777B-37066618BC82}"/>
-              </a:ext>
-            </a:extLst>
-          </p:cNvPr>
-          <p:cNvPicPr>
-            <a:picLocks noChangeAspect="1"/>
-          </p:cNvPicPr>
-          <p:nvPr/>
-        </p:nvPicPr>
-        <p:blipFill>
-          <a:blip r:embed="rId2"/>
-          <a:stretch>
-            <a:fillRect/>
-          </a:stretch>
-        </p:blipFill>
-        <p:spPr>
-          <a:xfrm>
-            <a:off x="5033022" y="1238683"/>
-            <a:ext cx="3213359" cy="4380633"/>
-          </a:xfrm>
-          <a:prstGeom prst="rect">
-            <a:avLst/>
-          </a:prstGeom>
-        </p:spPr>
-      </p:pic>
-      <p:sp>
-        <p:nvSpPr>
-          <p:cNvPr id="2" name="Titre 1">
-            <a:extLst>
-              <a:ext uri="{FF2B5EF4-FFF2-40B4-BE49-F238E27FC236}">
-                <a16:creationId xmlns:a16="http://schemas.microsoft.com/office/drawing/2014/main" id="{AA72167C-A523-4ACA-8E54-6B6FC3BF1142}"/>
+                <a16:creationId xmlns:a16="http://schemas.microsoft.com/office/drawing/2014/main" id="{406A12DA-9A2D-4669-8BCC-6EF19F2F83DB}"/>
               </a:ext>
             </a:extLst>
           </p:cNvPr>
@@ -6357,22 +6774,29 @@
         </p:nvSpPr>
         <p:spPr/>
         <p:txBody>
-          <a:bodyPr/>
+          <a:bodyPr>
+            <a:normAutofit/>
+          </a:bodyPr>
           <a:lstStyle/>
           <a:p>
             <a:r>
               <a:rPr lang="fr-FR" dirty="0"/>
-              <a:t>a)  Expérience</a:t>
-            </a:r>
+              <a:t>II.  </a:t>
+            </a:r>
+            <a:r>
+              <a:rPr lang="fr-FR" sz="3600" dirty="0"/>
+              <a:t>Mesure de la déformation d’un front d’onde type Shack-Hartmann</a:t>
+            </a:r>
+            <a:endParaRPr lang="fr-FR" dirty="0"/>
           </a:p>
         </p:txBody>
       </p:sp>
       <p:pic>
         <p:nvPicPr>
-          <p:cNvPr id="6146" name="Picture 2">
+          <p:cNvPr id="5122" name="Picture 2">
             <a:extLst>
               <a:ext uri="{FF2B5EF4-FFF2-40B4-BE49-F238E27FC236}">
-                <a16:creationId xmlns:a16="http://schemas.microsoft.com/office/drawing/2014/main" id="{748C01D8-82C1-4242-A5D5-F80C32992C25}"/>
+                <a16:creationId xmlns:a16="http://schemas.microsoft.com/office/drawing/2014/main" id="{BD846EA8-B6FA-480D-ADB8-64D9AEE0052A}"/>
               </a:ext>
             </a:extLst>
           </p:cNvPr>
@@ -6381,21 +6805,23 @@
           </p:cNvPicPr>
           <p:nvPr/>
         </p:nvPicPr>
-        <p:blipFill rotWithShape="1">
-          <a:blip r:embed="rId3">
+        <p:blipFill>
+          <a:blip r:embed="rId2">
             <a:extLst>
               <a:ext uri="{28A0092B-C50C-407E-A947-70E740481C1C}">
                 <a14:useLocalDpi xmlns:a14="http://schemas.microsoft.com/office/drawing/2010/main" val="0"/>
               </a:ext>
             </a:extLst>
           </a:blip>
-          <a:srcRect l="40856" t="18236" r="10919" b="48780"/>
-          <a:stretch/>
+          <a:srcRect/>
+          <a:stretch>
+            <a:fillRect/>
+          </a:stretch>
         </p:blipFill>
         <p:spPr bwMode="auto">
           <a:xfrm>
-            <a:off x="677334" y="1930400"/>
-            <a:ext cx="3328067" cy="3035030"/>
+            <a:off x="677334" y="2433808"/>
+            <a:ext cx="3712723" cy="2796145"/>
           </a:xfrm>
           <a:prstGeom prst="rect">
             <a:avLst/>
@@ -6412,12 +6838,59 @@
           </a:extLst>
         </p:spPr>
       </p:pic>
-      <p:sp>
-        <p:nvSpPr>
-          <p:cNvPr id="13" name="ZoneTexte 12">
+      <p:pic>
+        <p:nvPicPr>
+          <p:cNvPr id="5124" name="Picture 4">
             <a:extLst>
               <a:ext uri="{FF2B5EF4-FFF2-40B4-BE49-F238E27FC236}">
-                <a16:creationId xmlns:a16="http://schemas.microsoft.com/office/drawing/2014/main" id="{D50B28F4-D6D2-45D9-A52F-A26763E7AFDC}"/>
+                <a16:creationId xmlns:a16="http://schemas.microsoft.com/office/drawing/2014/main" id="{6E16F791-7F51-4997-9148-410C1DCDF900}"/>
+              </a:ext>
+            </a:extLst>
+          </p:cNvPr>
+          <p:cNvPicPr>
+            <a:picLocks noChangeAspect="1" noChangeArrowheads="1"/>
+          </p:cNvPicPr>
+          <p:nvPr/>
+        </p:nvPicPr>
+        <p:blipFill>
+          <a:blip r:embed="rId3">
+            <a:extLst>
+              <a:ext uri="{28A0092B-C50C-407E-A947-70E740481C1C}">
+                <a14:useLocalDpi xmlns:a14="http://schemas.microsoft.com/office/drawing/2010/main" val="0"/>
+              </a:ext>
+            </a:extLst>
+          </a:blip>
+          <a:srcRect/>
+          <a:stretch>
+            <a:fillRect/>
+          </a:stretch>
+        </p:blipFill>
+        <p:spPr bwMode="auto">
+          <a:xfrm>
+            <a:off x="4858937" y="2950814"/>
+            <a:ext cx="4216970" cy="1762135"/>
+          </a:xfrm>
+          <a:prstGeom prst="rect">
+            <a:avLst/>
+          </a:prstGeom>
+          <a:noFill/>
+          <a:extLst>
+            <a:ext uri="{909E8E84-426E-40DD-AFC4-6F175D3DCCD1}">
+              <a14:hiddenFill xmlns:a14="http://schemas.microsoft.com/office/drawing/2010/main">
+                <a:solidFill>
+                  <a:srgbClr val="FFFFFF"/>
+                </a:solidFill>
+              </a14:hiddenFill>
+            </a:ext>
+          </a:extLst>
+        </p:spPr>
+      </p:pic>
+      <p:sp>
+        <p:nvSpPr>
+          <p:cNvPr id="7" name="ZoneTexte 6">
+            <a:extLst>
+              <a:ext uri="{FF2B5EF4-FFF2-40B4-BE49-F238E27FC236}">
+                <a16:creationId xmlns:a16="http://schemas.microsoft.com/office/drawing/2014/main" id="{06C8B730-B79F-4879-89D9-36F122E34983}"/>
               </a:ext>
             </a:extLst>
           </p:cNvPr>
@@ -6426,8 +6899,8 @@
         </p:nvSpPr>
         <p:spPr>
           <a:xfrm>
-            <a:off x="341600" y="5221592"/>
-            <a:ext cx="4248724" cy="1477328"/>
+            <a:off x="4460132" y="4755002"/>
+            <a:ext cx="2650787" cy="861774"/>
           </a:xfrm>
           <a:prstGeom prst="rect">
             <a:avLst/>
@@ -6449,29 +6922,54 @@
               </a:spcAft>
             </a:pPr>
             <a:r>
-              <a:rPr lang="fr-FR" sz="1800" b="1" i="0" u="none" strike="noStrike" dirty="0">
+              <a:rPr lang="fr-FR" sz="1400" b="0" i="0" u="none" strike="noStrike" dirty="0">
                 <a:solidFill>
                   <a:srgbClr val="000000"/>
                 </a:solidFill>
                 <a:effectLst/>
                 <a:latin typeface="Roboto" panose="02000000000000000000" pitchFamily="2" charset="0"/>
               </a:rPr>
-              <a:t>Observation </a:t>
-            </a:r>
-            <a:r>
-              <a:rPr lang="fr-FR" sz="1800" b="0" i="0" u="none" strike="noStrike" dirty="0">
-                <a:solidFill>
-                  <a:srgbClr val="000000"/>
-                </a:solidFill>
-                <a:effectLst/>
-                <a:latin typeface="Roboto" panose="02000000000000000000" pitchFamily="2" charset="0"/>
-              </a:rPr>
-              <a:t>:</a:t>
-            </a:r>
-            <a:endParaRPr lang="fr-FR" b="0" dirty="0">
+              <a:t>Positions idéales des points</a:t>
+            </a:r>
+            <a:endParaRPr lang="fr-FR" sz="1400" b="0" dirty="0">
               <a:effectLst/>
             </a:endParaRPr>
           </a:p>
+          <a:p>
+            <a:br>
+              <a:rPr lang="fr-FR" dirty="0"/>
+            </a:br>
+            <a:endParaRPr lang="fr-FR" dirty="0"/>
+          </a:p>
+        </p:txBody>
+      </p:sp>
+      <p:sp>
+        <p:nvSpPr>
+          <p:cNvPr id="8" name="ZoneTexte 7">
+            <a:extLst>
+              <a:ext uri="{FF2B5EF4-FFF2-40B4-BE49-F238E27FC236}">
+                <a16:creationId xmlns:a16="http://schemas.microsoft.com/office/drawing/2014/main" id="{28F53D53-C429-4D53-94FC-85FBF400D6A2}"/>
+              </a:ext>
+            </a:extLst>
+          </p:cNvPr>
+          <p:cNvSpPr txBox="1"/>
+          <p:nvPr/>
+        </p:nvSpPr>
+        <p:spPr>
+          <a:xfrm>
+            <a:off x="6901746" y="4755002"/>
+            <a:ext cx="2650787" cy="861774"/>
+          </a:xfrm>
+          <a:prstGeom prst="rect">
+            <a:avLst/>
+          </a:prstGeom>
+          <a:noFill/>
+        </p:spPr>
+        <p:txBody>
+          <a:bodyPr wrap="square">
+            <a:spAutoFit/>
+          </a:bodyPr>
+          <a:lstStyle/>
           <a:p>
             <a:pPr algn="ctr" rtl="0">
               <a:spcBef>
@@ -6482,16 +6980,16 @@
               </a:spcAft>
             </a:pPr>
             <a:r>
-              <a:rPr lang="fr-FR" sz="1800" b="0" i="0" u="none" strike="noStrike" dirty="0">
+              <a:rPr lang="fr-FR" sz="1400" b="0" i="0" u="none" strike="noStrike" dirty="0">
                 <a:solidFill>
                   <a:srgbClr val="000000"/>
                 </a:solidFill>
                 <a:effectLst/>
                 <a:latin typeface="Roboto" panose="02000000000000000000" pitchFamily="2" charset="0"/>
               </a:rPr>
-              <a:t>Le Rayon est dévié par le plastique par rapport à une trajectoire idéale</a:t>
-            </a:r>
-            <a:endParaRPr lang="fr-FR" b="0" dirty="0">
+              <a:t>Positions réelles des points</a:t>
+            </a:r>
+            <a:endParaRPr lang="fr-FR" sz="1400" b="0" dirty="0">
               <a:effectLst/>
             </a:endParaRPr>
           </a:p>
@@ -6503,128 +7001,10 @@
           </a:p>
         </p:txBody>
       </p:sp>
-      <p:sp>
-        <p:nvSpPr>
-          <p:cNvPr id="15" name="ZoneTexte 14">
-            <a:extLst>
-              <a:ext uri="{FF2B5EF4-FFF2-40B4-BE49-F238E27FC236}">
-                <a16:creationId xmlns:a16="http://schemas.microsoft.com/office/drawing/2014/main" id="{CD771C15-5B88-4A51-ACA6-5FF723355DCA}"/>
-              </a:ext>
-            </a:extLst>
-          </p:cNvPr>
-          <p:cNvSpPr txBox="1"/>
-          <p:nvPr/>
-        </p:nvSpPr>
-        <p:spPr>
-          <a:xfrm>
-            <a:off x="5857323" y="5498591"/>
-            <a:ext cx="2658894" cy="1200329"/>
-          </a:xfrm>
-          <a:prstGeom prst="rect">
-            <a:avLst/>
-          </a:prstGeom>
-          <a:noFill/>
-        </p:spPr>
-        <p:txBody>
-          <a:bodyPr wrap="square">
-            <a:spAutoFit/>
-          </a:bodyPr>
-          <a:lstStyle/>
-          <a:p>
-            <a:pPr rtl="0">
-              <a:spcBef>
-                <a:spcPts val="0"/>
-              </a:spcBef>
-              <a:spcAft>
-                <a:spcPts val="0"/>
-              </a:spcAft>
-            </a:pPr>
-            <a:r>
-              <a:rPr lang="fr-FR" sz="1800" b="1" i="0" u="none" strike="noStrike" dirty="0">
-                <a:solidFill>
-                  <a:srgbClr val="000000"/>
-                </a:solidFill>
-                <a:effectLst/>
-                <a:latin typeface="Roboto" panose="02000000000000000000" pitchFamily="2" charset="0"/>
-              </a:rPr>
-              <a:t>Montage : </a:t>
-            </a:r>
-            <a:endParaRPr lang="fr-FR" b="0" dirty="0">
-              <a:effectLst/>
-            </a:endParaRPr>
-          </a:p>
-          <a:p>
-            <a:pPr rtl="0" fontAlgn="base">
-              <a:spcBef>
-                <a:spcPts val="0"/>
-              </a:spcBef>
-              <a:spcAft>
-                <a:spcPts val="0"/>
-              </a:spcAft>
-              <a:buFont typeface="Arial" panose="020B0604020202020204" pitchFamily="34" charset="0"/>
-              <a:buChar char="•"/>
-            </a:pPr>
-            <a:r>
-              <a:rPr lang="fr-FR" sz="1800" b="0" i="0" u="none" strike="noStrike" dirty="0">
-                <a:solidFill>
-                  <a:srgbClr val="000000"/>
-                </a:solidFill>
-                <a:effectLst/>
-                <a:latin typeface="Roboto" panose="02000000000000000000" pitchFamily="2" charset="0"/>
-              </a:rPr>
-              <a:t>Laser rouge</a:t>
-            </a:r>
-          </a:p>
-          <a:p>
-            <a:pPr rtl="0" fontAlgn="base">
-              <a:spcBef>
-                <a:spcPts val="0"/>
-              </a:spcBef>
-              <a:spcAft>
-                <a:spcPts val="0"/>
-              </a:spcAft>
-              <a:buFont typeface="Arial" panose="020B0604020202020204" pitchFamily="34" charset="0"/>
-              <a:buChar char="•"/>
-            </a:pPr>
-            <a:r>
-              <a:rPr lang="fr-FR" sz="1800" b="0" i="0" u="none" strike="noStrike" dirty="0">
-                <a:solidFill>
-                  <a:srgbClr val="000000"/>
-                </a:solidFill>
-                <a:effectLst/>
-                <a:latin typeface="Roboto" panose="02000000000000000000" pitchFamily="2" charset="0"/>
-              </a:rPr>
-              <a:t>Lentille convergente</a:t>
-            </a:r>
-          </a:p>
-          <a:p>
-            <a:pPr rtl="0" fontAlgn="base">
-              <a:spcBef>
-                <a:spcPts val="0"/>
-              </a:spcBef>
-              <a:spcAft>
-                <a:spcPts val="0"/>
-              </a:spcAft>
-              <a:buFont typeface="Arial" panose="020B0604020202020204" pitchFamily="34" charset="0"/>
-              <a:buChar char="•"/>
-            </a:pPr>
-            <a:r>
-              <a:rPr lang="fr-FR" sz="1800" b="0" i="0" u="none" strike="noStrike" dirty="0">
-                <a:solidFill>
-                  <a:srgbClr val="000000"/>
-                </a:solidFill>
-                <a:effectLst/>
-                <a:latin typeface="Roboto" panose="02000000000000000000" pitchFamily="2" charset="0"/>
-              </a:rPr>
-              <a:t>Plastique déformable</a:t>
-            </a:r>
-          </a:p>
-        </p:txBody>
-      </p:sp>
     </p:spTree>
     <p:extLst>
       <p:ext uri="{BB962C8B-B14F-4D97-AF65-F5344CB8AC3E}">
-        <p14:creationId xmlns:p14="http://schemas.microsoft.com/office/powerpoint/2010/main" val="566206286"/>
+        <p14:creationId xmlns:p14="http://schemas.microsoft.com/office/powerpoint/2010/main" val="1797730123"/>
       </p:ext>
     </p:extLst>
   </p:cSld>
@@ -6653,10 +7033,68 @@
       </p:grpSpPr>
       <p:pic>
         <p:nvPicPr>
-          <p:cNvPr id="1030" name="Picture 6">
+          <p:cNvPr id="3" name="Image 2">
             <a:extLst>
               <a:ext uri="{FF2B5EF4-FFF2-40B4-BE49-F238E27FC236}">
-                <a16:creationId xmlns:a16="http://schemas.microsoft.com/office/drawing/2014/main" id="{412B0527-5564-F2EF-2E3F-D1EBD17B7546}"/>
+                <a16:creationId xmlns:a16="http://schemas.microsoft.com/office/drawing/2014/main" id="{829C6A24-02E9-9C61-777B-37066618BC82}"/>
+              </a:ext>
+            </a:extLst>
+          </p:cNvPr>
+          <p:cNvPicPr>
+            <a:picLocks noChangeAspect="1"/>
+          </p:cNvPicPr>
+          <p:nvPr/>
+        </p:nvPicPr>
+        <p:blipFill>
+          <a:blip r:embed="rId2"/>
+          <a:stretch>
+            <a:fillRect/>
+          </a:stretch>
+        </p:blipFill>
+        <p:spPr>
+          <a:xfrm>
+            <a:off x="5033022" y="1238683"/>
+            <a:ext cx="3213359" cy="4380633"/>
+          </a:xfrm>
+          <a:prstGeom prst="rect">
+            <a:avLst/>
+          </a:prstGeom>
+        </p:spPr>
+      </p:pic>
+      <p:sp>
+        <p:nvSpPr>
+          <p:cNvPr id="2" name="Titre 1">
+            <a:extLst>
+              <a:ext uri="{FF2B5EF4-FFF2-40B4-BE49-F238E27FC236}">
+                <a16:creationId xmlns:a16="http://schemas.microsoft.com/office/drawing/2014/main" id="{AA72167C-A523-4ACA-8E54-6B6FC3BF1142}"/>
+              </a:ext>
+            </a:extLst>
+          </p:cNvPr>
+          <p:cNvSpPr>
+            <a:spLocks noGrp="1"/>
+          </p:cNvSpPr>
+          <p:nvPr>
+            <p:ph type="title"/>
+          </p:nvPr>
+        </p:nvSpPr>
+        <p:spPr/>
+        <p:txBody>
+          <a:bodyPr/>
+          <a:lstStyle/>
+          <a:p>
+            <a:r>
+              <a:rPr lang="fr-FR" dirty="0"/>
+              <a:t>a)  Expérience</a:t>
+            </a:r>
+          </a:p>
+        </p:txBody>
+      </p:sp>
+      <p:pic>
+        <p:nvPicPr>
+          <p:cNvPr id="6146" name="Picture 2">
+            <a:extLst>
+              <a:ext uri="{FF2B5EF4-FFF2-40B4-BE49-F238E27FC236}">
+                <a16:creationId xmlns:a16="http://schemas.microsoft.com/office/drawing/2014/main" id="{748C01D8-82C1-4242-A5D5-F80C32992C25}"/>
               </a:ext>
             </a:extLst>
           </p:cNvPr>
@@ -6665,23 +7103,21 @@
           </p:cNvPicPr>
           <p:nvPr/>
         </p:nvPicPr>
-        <p:blipFill>
-          <a:blip r:embed="rId2">
+        <p:blipFill rotWithShape="1">
+          <a:blip r:embed="rId3">
             <a:extLst>
               <a:ext uri="{28A0092B-C50C-407E-A947-70E740481C1C}">
                 <a14:useLocalDpi xmlns:a14="http://schemas.microsoft.com/office/drawing/2010/main" val="0"/>
               </a:ext>
             </a:extLst>
           </a:blip>
-          <a:srcRect/>
-          <a:stretch>
-            <a:fillRect/>
-          </a:stretch>
+          <a:srcRect l="40856" t="18236" r="10919" b="48780"/>
+          <a:stretch/>
         </p:blipFill>
         <p:spPr bwMode="auto">
           <a:xfrm>
-            <a:off x="528478" y="2152685"/>
-            <a:ext cx="4462670" cy="3290775"/>
+            <a:off x="677334" y="1930400"/>
+            <a:ext cx="3328067" cy="3035030"/>
           </a:xfrm>
           <a:prstGeom prst="rect">
             <a:avLst/>
@@ -6700,82 +7136,10 @@
       </p:pic>
       <p:sp>
         <p:nvSpPr>
-          <p:cNvPr id="2" name="Titre 1">
+          <p:cNvPr id="13" name="ZoneTexte 12">
             <a:extLst>
               <a:ext uri="{FF2B5EF4-FFF2-40B4-BE49-F238E27FC236}">
-                <a16:creationId xmlns:a16="http://schemas.microsoft.com/office/drawing/2014/main" id="{DE8E669D-15B5-4CA1-A1B5-5DE422195549}"/>
-              </a:ext>
-            </a:extLst>
-          </p:cNvPr>
-          <p:cNvSpPr>
-            <a:spLocks noGrp="1"/>
-          </p:cNvSpPr>
-          <p:nvPr>
-            <p:ph type="title"/>
-          </p:nvPr>
-        </p:nvSpPr>
-        <p:spPr>
-          <a:xfrm>
-            <a:off x="294562" y="416906"/>
-            <a:ext cx="8596668" cy="1320800"/>
-          </a:xfrm>
-        </p:spPr>
-        <p:txBody>
-          <a:bodyPr>
-            <a:normAutofit/>
-          </a:bodyPr>
-          <a:lstStyle/>
-          <a:p>
-            <a:r>
-              <a:rPr lang="fr-FR" sz="2800" b="1" u="sng" dirty="0">
-                <a:solidFill>
-                  <a:schemeClr val="tx1">
-                    <a:lumMod val="75000"/>
-                    <a:lumOff val="25000"/>
-                  </a:schemeClr>
-                </a:solidFill>
-              </a:rPr>
-              <a:t>Modélisation de la déviation du faisceau</a:t>
-            </a:r>
-          </a:p>
-        </p:txBody>
-      </p:sp>
-      <p:pic>
-        <p:nvPicPr>
-          <p:cNvPr id="25" name="Image 24">
-            <a:extLst>
-              <a:ext uri="{FF2B5EF4-FFF2-40B4-BE49-F238E27FC236}">
-                <a16:creationId xmlns:a16="http://schemas.microsoft.com/office/drawing/2014/main" id="{77CF94AE-C0C5-480C-82C2-4F6D430C1090}"/>
-              </a:ext>
-            </a:extLst>
-          </p:cNvPr>
-          <p:cNvPicPr>
-            <a:picLocks noChangeAspect="1"/>
-          </p:cNvPicPr>
-          <p:nvPr/>
-        </p:nvPicPr>
-        <p:blipFill>
-          <a:blip r:embed="rId3"/>
-          <a:stretch>
-            <a:fillRect/>
-          </a:stretch>
-        </p:blipFill>
-        <p:spPr>
-          <a:xfrm>
-            <a:off x="1372085" y="4604848"/>
-            <a:ext cx="513515" cy="353959"/>
-          </a:xfrm>
-          <a:prstGeom prst="rect">
-            <a:avLst/>
-          </a:prstGeom>
-        </p:spPr>
-      </p:pic>
-      <p:sp>
-        <p:nvSpPr>
-          <p:cNvPr id="3" name="ZoneTexte 2">
-            <a:extLst>
-              <a:ext uri="{FF2B5EF4-FFF2-40B4-BE49-F238E27FC236}">
-                <a16:creationId xmlns:a16="http://schemas.microsoft.com/office/drawing/2014/main" id="{A861F4BC-DE14-4953-4458-45DF4400A572}"/>
+                <a16:creationId xmlns:a16="http://schemas.microsoft.com/office/drawing/2014/main" id="{D50B28F4-D6D2-45D9-A52F-A26763E7AFDC}"/>
               </a:ext>
             </a:extLst>
           </p:cNvPr>
@@ -6784,8 +7148,8 @@
         </p:nvSpPr>
         <p:spPr>
           <a:xfrm>
-            <a:off x="819192" y="1414540"/>
-            <a:ext cx="4462670" cy="646331"/>
+            <a:off x="341600" y="5221592"/>
+            <a:ext cx="4248724" cy="1477328"/>
           </a:xfrm>
           <a:prstGeom prst="rect">
             <a:avLst/>
@@ -6793,69 +7157,196 @@
           <a:noFill/>
         </p:spPr>
         <p:txBody>
-          <a:bodyPr wrap="square" rtlCol="0">
+          <a:bodyPr wrap="square">
             <a:spAutoFit/>
           </a:bodyPr>
           <a:lstStyle/>
           <a:p>
-            <a:r>
+            <a:pPr algn="ctr" rtl="0">
+              <a:spcBef>
+                <a:spcPts val="0"/>
+              </a:spcBef>
+              <a:spcAft>
+                <a:spcPts val="0"/>
+              </a:spcAft>
+            </a:pPr>
+            <a:r>
+              <a:rPr lang="fr-FR" sz="1800" b="1" i="0" u="none" strike="noStrike" dirty="0">
+                <a:solidFill>
+                  <a:srgbClr val="000000"/>
+                </a:solidFill>
+                <a:effectLst/>
+                <a:latin typeface="Roboto" panose="02000000000000000000" pitchFamily="2" charset="0"/>
+              </a:rPr>
+              <a:t>Observation </a:t>
+            </a:r>
+            <a:r>
+              <a:rPr lang="fr-FR" sz="1800" b="0" i="0" u="none" strike="noStrike" dirty="0">
+                <a:solidFill>
+                  <a:srgbClr val="000000"/>
+                </a:solidFill>
+                <a:effectLst/>
+                <a:latin typeface="Roboto" panose="02000000000000000000" pitchFamily="2" charset="0"/>
+              </a:rPr>
+              <a:t>:</a:t>
+            </a:r>
+            <a:endParaRPr lang="fr-FR" b="0" dirty="0">
+              <a:effectLst/>
+            </a:endParaRPr>
+          </a:p>
+          <a:p>
+            <a:pPr algn="ctr" rtl="0">
+              <a:spcBef>
+                <a:spcPts val="0"/>
+              </a:spcBef>
+              <a:spcAft>
+                <a:spcPts val="0"/>
+              </a:spcAft>
+            </a:pPr>
+            <a:r>
+              <a:rPr lang="fr-FR" sz="1800" b="0" i="0" u="none" strike="noStrike" dirty="0">
+                <a:solidFill>
+                  <a:srgbClr val="000000"/>
+                </a:solidFill>
+                <a:effectLst/>
+                <a:latin typeface="Roboto" panose="02000000000000000000" pitchFamily="2" charset="0"/>
+              </a:rPr>
+              <a:t>Le Rayon est dévié par le plastique par rapport à une trajectoire idéale</a:t>
+            </a:r>
+            <a:endParaRPr lang="fr-FR" b="0" dirty="0">
+              <a:effectLst/>
+            </a:endParaRPr>
+          </a:p>
+          <a:p>
+            <a:br>
               <a:rPr lang="fr-FR" dirty="0"/>
-              <a:t>On assimile localement le pochon à deux sphères concentriques de rayon différent</a:t>
-            </a:r>
-          </a:p>
-        </p:txBody>
-      </p:sp>
-      <p:pic>
-        <p:nvPicPr>
-          <p:cNvPr id="1028" name="Picture 4">
+            </a:br>
+            <a:endParaRPr lang="fr-FR" dirty="0"/>
+          </a:p>
+        </p:txBody>
+      </p:sp>
+      <p:sp>
+        <p:nvSpPr>
+          <p:cNvPr id="15" name="ZoneTexte 14">
             <a:extLst>
               <a:ext uri="{FF2B5EF4-FFF2-40B4-BE49-F238E27FC236}">
-                <a16:creationId xmlns:a16="http://schemas.microsoft.com/office/drawing/2014/main" id="{4BC85F84-D3E7-450B-FC83-7C69EFB33FC1}"/>
+                <a16:creationId xmlns:a16="http://schemas.microsoft.com/office/drawing/2014/main" id="{CD771C15-5B88-4A51-ACA6-5FF723355DCA}"/>
               </a:ext>
             </a:extLst>
           </p:cNvPr>
-          <p:cNvPicPr>
-            <a:picLocks noChangeAspect="1" noChangeArrowheads="1"/>
-          </p:cNvPicPr>
+          <p:cNvSpPr txBox="1"/>
           <p:nvPr/>
-        </p:nvPicPr>
-        <p:blipFill>
-          <a:blip r:embed="rId4">
-            <a:extLst>
-              <a:ext uri="{28A0092B-C50C-407E-A947-70E740481C1C}">
-                <a14:useLocalDpi xmlns:a14="http://schemas.microsoft.com/office/drawing/2010/main" val="0"/>
-              </a:ext>
-            </a:extLst>
-          </a:blip>
-          <a:srcRect/>
-          <a:stretch>
-            <a:fillRect/>
-          </a:stretch>
-        </p:blipFill>
-        <p:spPr bwMode="auto">
-          <a:xfrm>
-            <a:off x="5837516" y="2071504"/>
-            <a:ext cx="2726676" cy="3117026"/>
+        </p:nvSpPr>
+        <p:spPr>
+          <a:xfrm>
+            <a:off x="5857323" y="5498591"/>
+            <a:ext cx="2658894" cy="1200329"/>
           </a:xfrm>
           <a:prstGeom prst="rect">
             <a:avLst/>
           </a:prstGeom>
           <a:noFill/>
-          <a:extLst>
-            <a:ext uri="{909E8E84-426E-40DD-AFC4-6F175D3DCCD1}">
-              <a14:hiddenFill xmlns:a14="http://schemas.microsoft.com/office/drawing/2010/main">
-                <a:solidFill>
-                  <a:srgbClr val="FFFFFF"/>
-                </a:solidFill>
-              </a14:hiddenFill>
-            </a:ext>
-          </a:extLst>
-        </p:spPr>
-      </p:pic>
+        </p:spPr>
+        <p:txBody>
+          <a:bodyPr wrap="square">
+            <a:spAutoFit/>
+          </a:bodyPr>
+          <a:lstStyle/>
+          <a:p>
+            <a:pPr rtl="0">
+              <a:spcBef>
+                <a:spcPts val="0"/>
+              </a:spcBef>
+              <a:spcAft>
+                <a:spcPts val="0"/>
+              </a:spcAft>
+            </a:pPr>
+            <a:r>
+              <a:rPr lang="fr-FR" sz="1800" b="1" i="0" u="none" strike="noStrike" dirty="0">
+                <a:solidFill>
+                  <a:srgbClr val="000000"/>
+                </a:solidFill>
+                <a:effectLst/>
+                <a:latin typeface="Roboto" panose="02000000000000000000" pitchFamily="2" charset="0"/>
+              </a:rPr>
+              <a:t>Montage : </a:t>
+            </a:r>
+            <a:endParaRPr lang="fr-FR" b="0" dirty="0">
+              <a:effectLst/>
+            </a:endParaRPr>
+          </a:p>
+          <a:p>
+            <a:pPr rtl="0" fontAlgn="base">
+              <a:spcBef>
+                <a:spcPts val="0"/>
+              </a:spcBef>
+              <a:spcAft>
+                <a:spcPts val="0"/>
+              </a:spcAft>
+              <a:buFont typeface="Arial" panose="020B0604020202020204" pitchFamily="34" charset="0"/>
+              <a:buChar char="•"/>
+            </a:pPr>
+            <a:r>
+              <a:rPr lang="fr-FR" sz="1800" b="0" i="0" u="none" strike="noStrike" dirty="0">
+                <a:solidFill>
+                  <a:srgbClr val="000000"/>
+                </a:solidFill>
+                <a:effectLst/>
+                <a:latin typeface="Roboto" panose="02000000000000000000" pitchFamily="2" charset="0"/>
+              </a:rPr>
+              <a:t>Laser rouge</a:t>
+            </a:r>
+          </a:p>
+          <a:p>
+            <a:pPr rtl="0" fontAlgn="base">
+              <a:spcBef>
+                <a:spcPts val="0"/>
+              </a:spcBef>
+              <a:spcAft>
+                <a:spcPts val="0"/>
+              </a:spcAft>
+              <a:buFont typeface="Arial" panose="020B0604020202020204" pitchFamily="34" charset="0"/>
+              <a:buChar char="•"/>
+            </a:pPr>
+            <a:r>
+              <a:rPr lang="fr-FR" sz="1800" b="0" i="0" u="none" strike="noStrike" dirty="0">
+                <a:solidFill>
+                  <a:srgbClr val="000000"/>
+                </a:solidFill>
+                <a:effectLst/>
+                <a:latin typeface="Roboto" panose="02000000000000000000" pitchFamily="2" charset="0"/>
+              </a:rPr>
+              <a:t>Lentille convergente</a:t>
+            </a:r>
+          </a:p>
+          <a:p>
+            <a:pPr rtl="0" fontAlgn="base">
+              <a:spcBef>
+                <a:spcPts val="0"/>
+              </a:spcBef>
+              <a:spcAft>
+                <a:spcPts val="0"/>
+              </a:spcAft>
+              <a:buFont typeface="Arial" panose="020B0604020202020204" pitchFamily="34" charset="0"/>
+              <a:buChar char="•"/>
+            </a:pPr>
+            <a:r>
+              <a:rPr lang="fr-FR" sz="1800" b="0" i="0" u="none" strike="noStrike" dirty="0">
+                <a:solidFill>
+                  <a:srgbClr val="000000"/>
+                </a:solidFill>
+                <a:effectLst/>
+                <a:latin typeface="Roboto" panose="02000000000000000000" pitchFamily="2" charset="0"/>
+              </a:rPr>
+              <a:t>Plastique déformable</a:t>
+            </a:r>
+          </a:p>
+        </p:txBody>
+      </p:sp>
     </p:spTree>
     <p:extLst>
       <p:ext uri="{BB962C8B-B14F-4D97-AF65-F5344CB8AC3E}">
-        <p14:creationId xmlns:p14="http://schemas.microsoft.com/office/powerpoint/2010/main" val="1944304529"/>
+        <p14:creationId xmlns:p14="http://schemas.microsoft.com/office/powerpoint/2010/main" val="566206286"/>
       </p:ext>
     </p:extLst>
   </p:cSld>
@@ -6957,100 +7448,6 @@
       </p:pic>
       <p:pic>
         <p:nvPicPr>
-          <p:cNvPr id="7172" name="Picture 4">
-            <a:extLst>
-              <a:ext uri="{FF2B5EF4-FFF2-40B4-BE49-F238E27FC236}">
-                <a16:creationId xmlns:a16="http://schemas.microsoft.com/office/drawing/2014/main" id="{C282618F-A559-4A7F-98C3-1CA44BF22A5B}"/>
-              </a:ext>
-            </a:extLst>
-          </p:cNvPr>
-          <p:cNvPicPr>
-            <a:picLocks noChangeAspect="1" noChangeArrowheads="1"/>
-          </p:cNvPicPr>
-          <p:nvPr/>
-        </p:nvPicPr>
-        <p:blipFill>
-          <a:blip r:embed="rId3">
-            <a:extLst>
-              <a:ext uri="{28A0092B-C50C-407E-A947-70E740481C1C}">
-                <a14:useLocalDpi xmlns:a14="http://schemas.microsoft.com/office/drawing/2010/main" val="0"/>
-              </a:ext>
-            </a:extLst>
-          </a:blip>
-          <a:srcRect/>
-          <a:stretch>
-            <a:fillRect/>
-          </a:stretch>
-        </p:blipFill>
-        <p:spPr bwMode="auto">
-          <a:xfrm>
-            <a:off x="4810298" y="1425102"/>
-            <a:ext cx="3543300" cy="2362200"/>
-          </a:xfrm>
-          <a:prstGeom prst="rect">
-            <a:avLst/>
-          </a:prstGeom>
-          <a:noFill/>
-          <a:extLst>
-            <a:ext uri="{909E8E84-426E-40DD-AFC4-6F175D3DCCD1}">
-              <a14:hiddenFill xmlns:a14="http://schemas.microsoft.com/office/drawing/2010/main">
-                <a:solidFill>
-                  <a:srgbClr val="FFFFFF"/>
-                </a:solidFill>
-              </a14:hiddenFill>
-            </a:ext>
-          </a:extLst>
-        </p:spPr>
-      </p:pic>
-      <p:pic>
-        <p:nvPicPr>
-          <p:cNvPr id="7174" name="Picture 6">
-            <a:extLst>
-              <a:ext uri="{FF2B5EF4-FFF2-40B4-BE49-F238E27FC236}">
-                <a16:creationId xmlns:a16="http://schemas.microsoft.com/office/drawing/2014/main" id="{590C773D-F038-4D56-864E-25A4CAD49CE9}"/>
-              </a:ext>
-            </a:extLst>
-          </p:cNvPr>
-          <p:cNvPicPr>
-            <a:picLocks noChangeAspect="1" noChangeArrowheads="1"/>
-          </p:cNvPicPr>
-          <p:nvPr/>
-        </p:nvPicPr>
-        <p:blipFill>
-          <a:blip r:embed="rId4">
-            <a:extLst>
-              <a:ext uri="{28A0092B-C50C-407E-A947-70E740481C1C}">
-                <a14:useLocalDpi xmlns:a14="http://schemas.microsoft.com/office/drawing/2010/main" val="0"/>
-              </a:ext>
-            </a:extLst>
-          </a:blip>
-          <a:srcRect/>
-          <a:stretch>
-            <a:fillRect/>
-          </a:stretch>
-        </p:blipFill>
-        <p:spPr bwMode="auto">
-          <a:xfrm>
-            <a:off x="492261" y="4183704"/>
-            <a:ext cx="3600450" cy="2362200"/>
-          </a:xfrm>
-          <a:prstGeom prst="rect">
-            <a:avLst/>
-          </a:prstGeom>
-          <a:noFill/>
-          <a:extLst>
-            <a:ext uri="{909E8E84-426E-40DD-AFC4-6F175D3DCCD1}">
-              <a14:hiddenFill xmlns:a14="http://schemas.microsoft.com/office/drawing/2010/main">
-                <a:solidFill>
-                  <a:srgbClr val="FFFFFF"/>
-                </a:solidFill>
-              </a14:hiddenFill>
-            </a:ext>
-          </a:extLst>
-        </p:spPr>
-      </p:pic>
-      <p:pic>
-        <p:nvPicPr>
           <p:cNvPr id="7176" name="Picture 8">
             <a:extLst>
               <a:ext uri="{FF2B5EF4-FFF2-40B4-BE49-F238E27FC236}">
@@ -7064,7 +7461,7 @@
           <p:nvPr/>
         </p:nvPicPr>
         <p:blipFill rotWithShape="1">
-          <a:blip r:embed="rId5">
+          <a:blip r:embed="rId3">
             <a:extLst>
               <a:ext uri="{28A0092B-C50C-407E-A947-70E740481C1C}">
                 <a14:useLocalDpi xmlns:a14="http://schemas.microsoft.com/office/drawing/2010/main" val="0"/>
@@ -7224,12 +7621,59 @@
           <a:chExt cx="0" cy="0"/>
         </a:xfrm>
       </p:grpSpPr>
-      <p:sp>
-        <p:nvSpPr>
-          <p:cNvPr id="4" name="Titre 1">
+      <p:pic>
+        <p:nvPicPr>
+          <p:cNvPr id="1030" name="Picture 6">
             <a:extLst>
               <a:ext uri="{FF2B5EF4-FFF2-40B4-BE49-F238E27FC236}">
-                <a16:creationId xmlns:a16="http://schemas.microsoft.com/office/drawing/2014/main" id="{526C1435-A345-E1B1-FF8B-C74386EF4E53}"/>
+                <a16:creationId xmlns:a16="http://schemas.microsoft.com/office/drawing/2014/main" id="{412B0527-5564-F2EF-2E3F-D1EBD17B7546}"/>
+              </a:ext>
+            </a:extLst>
+          </p:cNvPr>
+          <p:cNvPicPr>
+            <a:picLocks noChangeAspect="1" noChangeArrowheads="1"/>
+          </p:cNvPicPr>
+          <p:nvPr/>
+        </p:nvPicPr>
+        <p:blipFill>
+          <a:blip r:embed="rId2">
+            <a:extLst>
+              <a:ext uri="{28A0092B-C50C-407E-A947-70E740481C1C}">
+                <a14:useLocalDpi xmlns:a14="http://schemas.microsoft.com/office/drawing/2010/main" val="0"/>
+              </a:ext>
+            </a:extLst>
+          </a:blip>
+          <a:srcRect/>
+          <a:stretch>
+            <a:fillRect/>
+          </a:stretch>
+        </p:blipFill>
+        <p:spPr bwMode="auto">
+          <a:xfrm>
+            <a:off x="528478" y="2152685"/>
+            <a:ext cx="4462670" cy="3290775"/>
+          </a:xfrm>
+          <a:prstGeom prst="rect">
+            <a:avLst/>
+          </a:prstGeom>
+          <a:noFill/>
+          <a:extLst>
+            <a:ext uri="{909E8E84-426E-40DD-AFC4-6F175D3DCCD1}">
+              <a14:hiddenFill xmlns:a14="http://schemas.microsoft.com/office/drawing/2010/main">
+                <a:solidFill>
+                  <a:srgbClr val="FFFFFF"/>
+                </a:solidFill>
+              </a14:hiddenFill>
+            </a:ext>
+          </a:extLst>
+        </p:spPr>
+      </p:pic>
+      <p:sp>
+        <p:nvSpPr>
+          <p:cNvPr id="2" name="Titre 1">
+            <a:extLst>
+              <a:ext uri="{FF2B5EF4-FFF2-40B4-BE49-F238E27FC236}">
+                <a16:creationId xmlns:a16="http://schemas.microsoft.com/office/drawing/2014/main" id="{DE8E669D-15B5-4CA1-A1B5-5DE422195549}"/>
               </a:ext>
             </a:extLst>
           </p:cNvPr>
@@ -7242,51 +7686,146 @@
         </p:nvSpPr>
         <p:spPr>
           <a:xfrm>
-            <a:off x="241928" y="194930"/>
-            <a:ext cx="9327374" cy="1320800"/>
+            <a:off x="294562" y="416906"/>
+            <a:ext cx="8596668" cy="1320800"/>
           </a:xfrm>
         </p:spPr>
         <p:txBody>
           <a:bodyPr>
-            <a:normAutofit fontScale="90000"/>
+            <a:normAutofit/>
           </a:bodyPr>
           <a:lstStyle/>
           <a:p>
-            <a:pPr>
-              <a:lnSpc>
-                <a:spcPct val="150000"/>
-              </a:lnSpc>
-              <a:spcAft>
-                <a:spcPts val="600"/>
-              </a:spcAft>
-            </a:pPr>
+            <a:r>
+              <a:rPr lang="fr-FR" sz="2800" b="1" u="sng" dirty="0">
+                <a:solidFill>
+                  <a:schemeClr val="tx1">
+                    <a:lumMod val="75000"/>
+                    <a:lumOff val="25000"/>
+                  </a:schemeClr>
+                </a:solidFill>
+              </a:rPr>
+              <a:t>Modélisation de la déviation du faisceau</a:t>
+            </a:r>
+          </a:p>
+        </p:txBody>
+      </p:sp>
+      <p:pic>
+        <p:nvPicPr>
+          <p:cNvPr id="25" name="Image 24">
+            <a:extLst>
+              <a:ext uri="{FF2B5EF4-FFF2-40B4-BE49-F238E27FC236}">
+                <a16:creationId xmlns:a16="http://schemas.microsoft.com/office/drawing/2014/main" id="{77CF94AE-C0C5-480C-82C2-4F6D430C1090}"/>
+              </a:ext>
+            </a:extLst>
+          </p:cNvPr>
+          <p:cNvPicPr>
+            <a:picLocks noChangeAspect="1"/>
+          </p:cNvPicPr>
+          <p:nvPr/>
+        </p:nvPicPr>
+        <p:blipFill>
+          <a:blip r:embed="rId3"/>
+          <a:stretch>
+            <a:fillRect/>
+          </a:stretch>
+        </p:blipFill>
+        <p:spPr>
+          <a:xfrm>
+            <a:off x="1372085" y="4604848"/>
+            <a:ext cx="513515" cy="353959"/>
+          </a:xfrm>
+          <a:prstGeom prst="rect">
+            <a:avLst/>
+          </a:prstGeom>
+        </p:spPr>
+      </p:pic>
+      <p:sp>
+        <p:nvSpPr>
+          <p:cNvPr id="3" name="ZoneTexte 2">
+            <a:extLst>
+              <a:ext uri="{FF2B5EF4-FFF2-40B4-BE49-F238E27FC236}">
+                <a16:creationId xmlns:a16="http://schemas.microsoft.com/office/drawing/2014/main" id="{A861F4BC-DE14-4953-4458-45DF4400A572}"/>
+              </a:ext>
+            </a:extLst>
+          </p:cNvPr>
+          <p:cNvSpPr txBox="1"/>
+          <p:nvPr/>
+        </p:nvSpPr>
+        <p:spPr>
+          <a:xfrm>
+            <a:off x="819192" y="1414540"/>
+            <a:ext cx="4462670" cy="646331"/>
+          </a:xfrm>
+          <a:prstGeom prst="rect">
+            <a:avLst/>
+          </a:prstGeom>
+          <a:noFill/>
+        </p:spPr>
+        <p:txBody>
+          <a:bodyPr wrap="square" rtlCol="0">
+            <a:spAutoFit/>
+          </a:bodyPr>
+          <a:lstStyle/>
+          <a:p>
             <a:r>
               <a:rPr lang="fr-FR" dirty="0"/>
-              <a:t>III.  </a:t>
-            </a:r>
-            <a:r>
-              <a:rPr lang="fr-FR" sz="3600" dirty="0"/>
-              <a:t>Traitement informatique du front d’onde reçu</a:t>
-            </a:r>
-            <a:br>
-              <a:rPr lang="fr-FR" dirty="0"/>
-            </a:br>
-            <a:r>
-              <a:rPr lang="fr-FR" dirty="0"/>
-              <a:t>	</a:t>
-            </a:r>
-            <a:r>
-              <a:rPr lang="fr-FR" sz="3600" dirty="0"/>
-              <a:t>a) Représentation des polynômes sur Python</a:t>
-            </a:r>
-            <a:endParaRPr lang="fr-FR" dirty="0"/>
-          </a:p>
-        </p:txBody>
-      </p:sp>
+              <a:t>On assimile localement le pochon à deux sphères concentriques de rayon différent</a:t>
+            </a:r>
+          </a:p>
+        </p:txBody>
+      </p:sp>
+      <p:pic>
+        <p:nvPicPr>
+          <p:cNvPr id="1028" name="Picture 4">
+            <a:extLst>
+              <a:ext uri="{FF2B5EF4-FFF2-40B4-BE49-F238E27FC236}">
+                <a16:creationId xmlns:a16="http://schemas.microsoft.com/office/drawing/2014/main" id="{4BC85F84-D3E7-450B-FC83-7C69EFB33FC1}"/>
+              </a:ext>
+            </a:extLst>
+          </p:cNvPr>
+          <p:cNvPicPr>
+            <a:picLocks noChangeAspect="1" noChangeArrowheads="1"/>
+          </p:cNvPicPr>
+          <p:nvPr/>
+        </p:nvPicPr>
+        <p:blipFill>
+          <a:blip r:embed="rId4">
+            <a:extLst>
+              <a:ext uri="{28A0092B-C50C-407E-A947-70E740481C1C}">
+                <a14:useLocalDpi xmlns:a14="http://schemas.microsoft.com/office/drawing/2010/main" val="0"/>
+              </a:ext>
+            </a:extLst>
+          </a:blip>
+          <a:srcRect/>
+          <a:stretch>
+            <a:fillRect/>
+          </a:stretch>
+        </p:blipFill>
+        <p:spPr bwMode="auto">
+          <a:xfrm>
+            <a:off x="5837516" y="2071504"/>
+            <a:ext cx="2726676" cy="3117026"/>
+          </a:xfrm>
+          <a:prstGeom prst="rect">
+            <a:avLst/>
+          </a:prstGeom>
+          <a:noFill/>
+          <a:extLst>
+            <a:ext uri="{909E8E84-426E-40DD-AFC4-6F175D3DCCD1}">
+              <a14:hiddenFill xmlns:a14="http://schemas.microsoft.com/office/drawing/2010/main">
+                <a:solidFill>
+                  <a:srgbClr val="FFFFFF"/>
+                </a:solidFill>
+              </a14:hiddenFill>
+            </a:ext>
+          </a:extLst>
+        </p:spPr>
+      </p:pic>
     </p:spTree>
     <p:extLst>
       <p:ext uri="{BB962C8B-B14F-4D97-AF65-F5344CB8AC3E}">
-        <p14:creationId xmlns:p14="http://schemas.microsoft.com/office/powerpoint/2010/main" val="1410433017"/>
+        <p14:creationId xmlns:p14="http://schemas.microsoft.com/office/powerpoint/2010/main" val="1944304529"/>
       </p:ext>
     </p:extLst>
   </p:cSld>
@@ -7315,6 +7854,95 @@
       </p:grpSpPr>
       <p:sp>
         <p:nvSpPr>
+          <p:cNvPr id="4" name="Titre 1">
+            <a:extLst>
+              <a:ext uri="{FF2B5EF4-FFF2-40B4-BE49-F238E27FC236}">
+                <a16:creationId xmlns:a16="http://schemas.microsoft.com/office/drawing/2014/main" id="{526C1435-A345-E1B1-FF8B-C74386EF4E53}"/>
+              </a:ext>
+            </a:extLst>
+          </p:cNvPr>
+          <p:cNvSpPr>
+            <a:spLocks noGrp="1"/>
+          </p:cNvSpPr>
+          <p:nvPr>
+            <p:ph type="title"/>
+          </p:nvPr>
+        </p:nvSpPr>
+        <p:spPr>
+          <a:xfrm>
+            <a:off x="241928" y="194930"/>
+            <a:ext cx="9327374" cy="1320800"/>
+          </a:xfrm>
+        </p:spPr>
+        <p:txBody>
+          <a:bodyPr>
+            <a:normAutofit fontScale="90000"/>
+          </a:bodyPr>
+          <a:lstStyle/>
+          <a:p>
+            <a:pPr>
+              <a:lnSpc>
+                <a:spcPct val="150000"/>
+              </a:lnSpc>
+              <a:spcAft>
+                <a:spcPts val="600"/>
+              </a:spcAft>
+            </a:pPr>
+            <a:r>
+              <a:rPr lang="fr-FR" dirty="0"/>
+              <a:t>III.  </a:t>
+            </a:r>
+            <a:r>
+              <a:rPr lang="fr-FR" sz="3600" dirty="0"/>
+              <a:t>Traitement informatique du front d’onde reçu</a:t>
+            </a:r>
+            <a:br>
+              <a:rPr lang="fr-FR" dirty="0"/>
+            </a:br>
+            <a:r>
+              <a:rPr lang="fr-FR" dirty="0"/>
+              <a:t>	</a:t>
+            </a:r>
+            <a:r>
+              <a:rPr lang="fr-FR" sz="3600" dirty="0"/>
+              <a:t>a) Représentation des polynômes sur Python</a:t>
+            </a:r>
+            <a:endParaRPr lang="fr-FR" dirty="0"/>
+          </a:p>
+        </p:txBody>
+      </p:sp>
+    </p:spTree>
+    <p:extLst>
+      <p:ext uri="{BB962C8B-B14F-4D97-AF65-F5344CB8AC3E}">
+        <p14:creationId xmlns:p14="http://schemas.microsoft.com/office/powerpoint/2010/main" val="1410433017"/>
+      </p:ext>
+    </p:extLst>
+  </p:cSld>
+  <p:clrMapOvr>
+    <a:masterClrMapping/>
+  </p:clrMapOvr>
+</p:sld>
+</file>
+
+<file path=ppt/slides/slide16.xml><?xml version="1.0" encoding="utf-8"?>
+<p:sld xmlns:a="http://schemas.openxmlformats.org/drawingml/2006/main" xmlns:r="http://schemas.openxmlformats.org/officeDocument/2006/relationships" xmlns:p="http://schemas.openxmlformats.org/presentationml/2006/main">
+  <p:cSld>
+    <p:spTree>
+      <p:nvGrpSpPr>
+        <p:cNvPr id="1" name=""/>
+        <p:cNvGrpSpPr/>
+        <p:nvPr/>
+      </p:nvGrpSpPr>
+      <p:grpSpPr>
+        <a:xfrm>
+          <a:off x="0" y="0"/>
+          <a:ext cx="0" cy="0"/>
+          <a:chOff x="0" y="0"/>
+          <a:chExt cx="0" cy="0"/>
+        </a:xfrm>
+      </p:grpSpPr>
+      <p:sp>
+        <p:nvSpPr>
           <p:cNvPr id="2" name="Titre 1">
             <a:extLst>
               <a:ext uri="{FF2B5EF4-FFF2-40B4-BE49-F238E27FC236}">
@@ -7613,7 +8241,7 @@
 </p:sld>
 </file>
 
-<file path=ppt/slides/slide16.xml><?xml version="1.0" encoding="utf-8"?>
+<file path=ppt/slides/slide17.xml><?xml version="1.0" encoding="utf-8"?>
 <p:sld xmlns:a="http://schemas.openxmlformats.org/drawingml/2006/main" xmlns:r="http://schemas.openxmlformats.org/officeDocument/2006/relationships" xmlns:p="http://schemas.openxmlformats.org/presentationml/2006/main">
   <p:cSld>
     <p:spTree>
@@ -8059,7 +8687,7 @@
 </p:sld>
 </file>
 
-<file path=ppt/slides/slide17.xml><?xml version="1.0" encoding="utf-8"?>
+<file path=ppt/slides/slide18.xml><?xml version="1.0" encoding="utf-8"?>
 <p:sld xmlns:a="http://schemas.openxmlformats.org/drawingml/2006/main" xmlns:r="http://schemas.openxmlformats.org/officeDocument/2006/relationships" xmlns:p="http://schemas.openxmlformats.org/presentationml/2006/main">
   <p:cSld>
     <p:spTree>
@@ -8533,588 +9161,6 @@
     <p:extLst>
       <p:ext uri="{BB962C8B-B14F-4D97-AF65-F5344CB8AC3E}">
         <p14:creationId xmlns:p14="http://schemas.microsoft.com/office/powerpoint/2010/main" val="2600506359"/>
-      </p:ext>
-    </p:extLst>
-  </p:cSld>
-  <p:clrMapOvr>
-    <a:masterClrMapping/>
-  </p:clrMapOvr>
-</p:sld>
-</file>
-
-<file path=ppt/slides/slide18.xml><?xml version="1.0" encoding="utf-8"?>
-<p:sld xmlns:a="http://schemas.openxmlformats.org/drawingml/2006/main" xmlns:r="http://schemas.openxmlformats.org/officeDocument/2006/relationships" xmlns:p="http://schemas.openxmlformats.org/presentationml/2006/main">
-  <p:cSld>
-    <p:spTree>
-      <p:nvGrpSpPr>
-        <p:cNvPr id="1" name=""/>
-        <p:cNvGrpSpPr/>
-        <p:nvPr/>
-      </p:nvGrpSpPr>
-      <p:grpSpPr>
-        <a:xfrm>
-          <a:off x="0" y="0"/>
-          <a:ext cx="0" cy="0"/>
-          <a:chOff x="0" y="0"/>
-          <a:chExt cx="0" cy="0"/>
-        </a:xfrm>
-      </p:grpSpPr>
-      <p:pic>
-        <p:nvPicPr>
-          <p:cNvPr id="16" name="Picture 2">
-            <a:extLst>
-              <a:ext uri="{FF2B5EF4-FFF2-40B4-BE49-F238E27FC236}">
-                <a16:creationId xmlns:a16="http://schemas.microsoft.com/office/drawing/2014/main" id="{3F540497-512B-81EE-EF98-4CBC9811E2F4}"/>
-              </a:ext>
-            </a:extLst>
-          </p:cNvPr>
-          <p:cNvPicPr>
-            <a:picLocks noChangeAspect="1" noChangeArrowheads="1"/>
-          </p:cNvPicPr>
-          <p:nvPr/>
-        </p:nvPicPr>
-        <p:blipFill>
-          <a:blip r:embed="rId2">
-            <a:extLst>
-              <a:ext uri="{28A0092B-C50C-407E-A947-70E740481C1C}">
-                <a14:useLocalDpi xmlns:a14="http://schemas.microsoft.com/office/drawing/2010/main" val="0"/>
-              </a:ext>
-            </a:extLst>
-          </a:blip>
-          <a:srcRect/>
-          <a:stretch>
-            <a:fillRect/>
-          </a:stretch>
-        </p:blipFill>
-        <p:spPr bwMode="auto">
-          <a:xfrm>
-            <a:off x="2121018" y="3510411"/>
-            <a:ext cx="5399372" cy="2185544"/>
-          </a:xfrm>
-          <a:prstGeom prst="rect">
-            <a:avLst/>
-          </a:prstGeom>
-          <a:noFill/>
-          <a:extLst>
-            <a:ext uri="{909E8E84-426E-40DD-AFC4-6F175D3DCCD1}">
-              <a14:hiddenFill xmlns:a14="http://schemas.microsoft.com/office/drawing/2010/main">
-                <a:solidFill>
-                  <a:srgbClr val="FFFFFF"/>
-                </a:solidFill>
-              </a14:hiddenFill>
-            </a:ext>
-          </a:extLst>
-        </p:spPr>
-      </p:pic>
-      <p:sp>
-        <p:nvSpPr>
-          <p:cNvPr id="2" name="Titre 1">
-            <a:extLst>
-              <a:ext uri="{FF2B5EF4-FFF2-40B4-BE49-F238E27FC236}">
-                <a16:creationId xmlns:a16="http://schemas.microsoft.com/office/drawing/2014/main" id="{2327E90D-33B7-2CED-F37A-3AA68301A1EC}"/>
-              </a:ext>
-            </a:extLst>
-          </p:cNvPr>
-          <p:cNvSpPr>
-            <a:spLocks noGrp="1"/>
-          </p:cNvSpPr>
-          <p:nvPr>
-            <p:ph type="title"/>
-          </p:nvPr>
-        </p:nvSpPr>
-        <p:spPr>
-          <a:xfrm>
-            <a:off x="549743" y="746238"/>
-            <a:ext cx="8596668" cy="1320800"/>
-          </a:xfrm>
-        </p:spPr>
-        <p:txBody>
-          <a:bodyPr>
-            <a:normAutofit/>
-          </a:bodyPr>
-          <a:lstStyle/>
-          <a:p>
-            <a:pPr algn="ctr"/>
-            <a:r>
-              <a:rPr lang="fr-FR" sz="2800" b="1" u="sng" dirty="0">
-                <a:solidFill>
-                  <a:schemeClr val="tx1">
-                    <a:lumMod val="75000"/>
-                    <a:lumOff val="25000"/>
-                  </a:schemeClr>
-                </a:solidFill>
-              </a:rPr>
-              <a:t>Projection sur la base des Polynômes de Zernike</a:t>
-            </a:r>
-          </a:p>
-        </p:txBody>
-      </p:sp>
-      <p:pic>
-        <p:nvPicPr>
-          <p:cNvPr id="4" name="Image 3">
-            <a:extLst>
-              <a:ext uri="{FF2B5EF4-FFF2-40B4-BE49-F238E27FC236}">
-                <a16:creationId xmlns:a16="http://schemas.microsoft.com/office/drawing/2014/main" id="{52DF1041-F812-DB5E-7F60-9D990FCEEC37}"/>
-              </a:ext>
-            </a:extLst>
-          </p:cNvPr>
-          <p:cNvPicPr>
-            <a:picLocks noChangeAspect="1"/>
-          </p:cNvPicPr>
-          <p:nvPr/>
-        </p:nvPicPr>
-        <p:blipFill>
-          <a:blip r:embed="rId3"/>
-          <a:stretch>
-            <a:fillRect/>
-          </a:stretch>
-        </p:blipFill>
-        <p:spPr>
-          <a:xfrm>
-            <a:off x="814578" y="1887859"/>
-            <a:ext cx="2847157" cy="769035"/>
-          </a:xfrm>
-          <a:prstGeom prst="rect">
-            <a:avLst/>
-          </a:prstGeom>
-        </p:spPr>
-      </p:pic>
-      <p:sp>
-        <p:nvSpPr>
-          <p:cNvPr id="5" name="ZoneTexte 4">
-            <a:extLst>
-              <a:ext uri="{FF2B5EF4-FFF2-40B4-BE49-F238E27FC236}">
-                <a16:creationId xmlns:a16="http://schemas.microsoft.com/office/drawing/2014/main" id="{FD0367DB-76C4-DBFF-5015-505FD3A56C85}"/>
-              </a:ext>
-            </a:extLst>
-          </p:cNvPr>
-          <p:cNvSpPr txBox="1"/>
-          <p:nvPr/>
-        </p:nvSpPr>
-        <p:spPr>
-          <a:xfrm>
-            <a:off x="1157120" y="2656894"/>
-            <a:ext cx="1864998" cy="369332"/>
-          </a:xfrm>
-          <a:prstGeom prst="rect">
-            <a:avLst/>
-          </a:prstGeom>
-          <a:noFill/>
-        </p:spPr>
-        <p:txBody>
-          <a:bodyPr wrap="none" rtlCol="0">
-            <a:spAutoFit/>
-          </a:bodyPr>
-          <a:lstStyle/>
-          <a:p>
-            <a:r>
-              <a:rPr lang="fr-FR" dirty="0"/>
-              <a:t>Produit scalaire</a:t>
-            </a:r>
-          </a:p>
-        </p:txBody>
-      </p:sp>
-      <p:sp>
-        <p:nvSpPr>
-          <p:cNvPr id="7" name="ZoneTexte 6">
-            <a:extLst>
-              <a:ext uri="{FF2B5EF4-FFF2-40B4-BE49-F238E27FC236}">
-                <a16:creationId xmlns:a16="http://schemas.microsoft.com/office/drawing/2014/main" id="{1E5779A9-B9BC-6A19-2D0A-C9ADA71B213B}"/>
-              </a:ext>
-            </a:extLst>
-          </p:cNvPr>
-          <p:cNvSpPr txBox="1"/>
-          <p:nvPr/>
-        </p:nvSpPr>
-        <p:spPr>
-          <a:xfrm>
-            <a:off x="4418038" y="3586471"/>
-            <a:ext cx="788156" cy="369332"/>
-          </a:xfrm>
-          <a:prstGeom prst="rect">
-            <a:avLst/>
-          </a:prstGeom>
-          <a:noFill/>
-        </p:spPr>
-        <p:txBody>
-          <a:bodyPr wrap="square" rtlCol="0">
-            <a:spAutoFit/>
-          </a:bodyPr>
-          <a:lstStyle/>
-          <a:p>
-            <a:r>
-              <a:rPr lang="fr-FR" dirty="0"/>
-              <a:t>0,068</a:t>
-            </a:r>
-          </a:p>
-        </p:txBody>
-      </p:sp>
-      <p:sp>
-        <p:nvSpPr>
-          <p:cNvPr id="8" name="ZoneTexte 7">
-            <a:extLst>
-              <a:ext uri="{FF2B5EF4-FFF2-40B4-BE49-F238E27FC236}">
-                <a16:creationId xmlns:a16="http://schemas.microsoft.com/office/drawing/2014/main" id="{ED6C262C-8187-7DB3-80B2-6718401B5791}"/>
-              </a:ext>
-            </a:extLst>
-          </p:cNvPr>
-          <p:cNvSpPr txBox="1"/>
-          <p:nvPr/>
-        </p:nvSpPr>
-        <p:spPr>
-          <a:xfrm>
-            <a:off x="3926958" y="3875407"/>
-            <a:ext cx="1864999" cy="369332"/>
-          </a:xfrm>
-          <a:prstGeom prst="rect">
-            <a:avLst/>
-          </a:prstGeom>
-          <a:noFill/>
-        </p:spPr>
-        <p:txBody>
-          <a:bodyPr wrap="square" rtlCol="0">
-            <a:spAutoFit/>
-          </a:bodyPr>
-          <a:lstStyle/>
-          <a:p>
-            <a:r>
-              <a:rPr lang="fr-FR" dirty="0"/>
-              <a:t>-0,019	-0,008</a:t>
-            </a:r>
-          </a:p>
-        </p:txBody>
-      </p:sp>
-      <p:sp>
-        <p:nvSpPr>
-          <p:cNvPr id="10" name="ZoneTexte 9">
-            <a:extLst>
-              <a:ext uri="{FF2B5EF4-FFF2-40B4-BE49-F238E27FC236}">
-                <a16:creationId xmlns:a16="http://schemas.microsoft.com/office/drawing/2014/main" id="{24F40267-0271-19A2-8991-6E14815B06C3}"/>
-              </a:ext>
-            </a:extLst>
-          </p:cNvPr>
-          <p:cNvSpPr txBox="1"/>
-          <p:nvPr/>
-        </p:nvSpPr>
-        <p:spPr>
-          <a:xfrm>
-            <a:off x="3446618" y="4229060"/>
-            <a:ext cx="2825678" cy="369332"/>
-          </a:xfrm>
-          <a:prstGeom prst="rect">
-            <a:avLst/>
-          </a:prstGeom>
-          <a:noFill/>
-        </p:spPr>
-        <p:txBody>
-          <a:bodyPr wrap="square" rtlCol="0">
-            <a:spAutoFit/>
-          </a:bodyPr>
-          <a:lstStyle/>
-          <a:p>
-            <a:r>
-              <a:rPr lang="fr-FR" dirty="0"/>
-              <a:t>-0,017	0,007	0,0002</a:t>
-            </a:r>
-          </a:p>
-        </p:txBody>
-      </p:sp>
-      <p:sp>
-        <p:nvSpPr>
-          <p:cNvPr id="11" name="ZoneTexte 10">
-            <a:extLst>
-              <a:ext uri="{FF2B5EF4-FFF2-40B4-BE49-F238E27FC236}">
-                <a16:creationId xmlns:a16="http://schemas.microsoft.com/office/drawing/2014/main" id="{F371E552-F9E0-F21D-1535-219FD302E971}"/>
-              </a:ext>
-            </a:extLst>
-          </p:cNvPr>
-          <p:cNvSpPr txBox="1"/>
-          <p:nvPr/>
-        </p:nvSpPr>
-        <p:spPr>
-          <a:xfrm>
-            <a:off x="2941593" y="4598392"/>
-            <a:ext cx="3835728" cy="369332"/>
-          </a:xfrm>
-          <a:prstGeom prst="rect">
-            <a:avLst/>
-          </a:prstGeom>
-          <a:noFill/>
-        </p:spPr>
-        <p:txBody>
-          <a:bodyPr wrap="square" rtlCol="0">
-            <a:spAutoFit/>
-          </a:bodyPr>
-          <a:lstStyle/>
-          <a:p>
-            <a:r>
-              <a:rPr lang="fr-FR" dirty="0"/>
-              <a:t>0,010	-0,023	0,010	-0,014</a:t>
-            </a:r>
-          </a:p>
-        </p:txBody>
-      </p:sp>
-      <p:sp>
-        <p:nvSpPr>
-          <p:cNvPr id="12" name="ZoneTexte 11">
-            <a:extLst>
-              <a:ext uri="{FF2B5EF4-FFF2-40B4-BE49-F238E27FC236}">
-                <a16:creationId xmlns:a16="http://schemas.microsoft.com/office/drawing/2014/main" id="{E764C544-A81E-A8FA-378B-B2D5FA476A6B}"/>
-              </a:ext>
-            </a:extLst>
-          </p:cNvPr>
-          <p:cNvSpPr txBox="1"/>
-          <p:nvPr/>
-        </p:nvSpPr>
-        <p:spPr>
-          <a:xfrm>
-            <a:off x="2542158" y="4957291"/>
-            <a:ext cx="4539916" cy="369332"/>
-          </a:xfrm>
-          <a:prstGeom prst="rect">
-            <a:avLst/>
-          </a:prstGeom>
-          <a:noFill/>
-        </p:spPr>
-        <p:txBody>
-          <a:bodyPr wrap="square" rtlCol="0">
-            <a:spAutoFit/>
-          </a:bodyPr>
-          <a:lstStyle/>
-          <a:p>
-            <a:r>
-              <a:rPr lang="fr-FR" dirty="0"/>
-              <a:t>0,006	-0,048	0,094	0,012	-0,004</a:t>
-            </a:r>
-          </a:p>
-        </p:txBody>
-      </p:sp>
-      <p:sp>
-        <p:nvSpPr>
-          <p:cNvPr id="13" name="ZoneTexte 12">
-            <a:extLst>
-              <a:ext uri="{FF2B5EF4-FFF2-40B4-BE49-F238E27FC236}">
-                <a16:creationId xmlns:a16="http://schemas.microsoft.com/office/drawing/2014/main" id="{7BB321E5-7584-4327-590F-1A37D84033FF}"/>
-              </a:ext>
-            </a:extLst>
-          </p:cNvPr>
-          <p:cNvSpPr txBox="1"/>
-          <p:nvPr/>
-        </p:nvSpPr>
-        <p:spPr>
-          <a:xfrm>
-            <a:off x="2121018" y="5312958"/>
-            <a:ext cx="5325979" cy="369332"/>
-          </a:xfrm>
-          <a:prstGeom prst="rect">
-            <a:avLst/>
-          </a:prstGeom>
-          <a:noFill/>
-        </p:spPr>
-        <p:txBody>
-          <a:bodyPr wrap="square" rtlCol="0">
-            <a:spAutoFit/>
-          </a:bodyPr>
-          <a:lstStyle/>
-          <a:p>
-            <a:r>
-              <a:rPr lang="fr-FR" dirty="0"/>
-              <a:t>0,0006	0,048	-0,117	0,023	-0,051	0,017</a:t>
-            </a:r>
-          </a:p>
-        </p:txBody>
-      </p:sp>
-      <p:sp>
-        <p:nvSpPr>
-          <p:cNvPr id="14" name="Rectangle 13">
-            <a:extLst>
-              <a:ext uri="{FF2B5EF4-FFF2-40B4-BE49-F238E27FC236}">
-                <a16:creationId xmlns:a16="http://schemas.microsoft.com/office/drawing/2014/main" id="{39FA6855-75BF-BB3C-9F17-3AC121C9F865}"/>
-              </a:ext>
-            </a:extLst>
-          </p:cNvPr>
-          <p:cNvSpPr/>
-          <p:nvPr/>
-        </p:nvSpPr>
-        <p:spPr>
-          <a:xfrm>
-            <a:off x="3949644" y="5307712"/>
-            <a:ext cx="834364" cy="364145"/>
-          </a:xfrm>
-          <a:prstGeom prst="rect">
-            <a:avLst/>
-          </a:prstGeom>
-          <a:noFill/>
-          <a:ln w="38100">
-            <a:solidFill>
-              <a:srgbClr val="FF0000"/>
-            </a:solidFill>
-          </a:ln>
-        </p:spPr>
-        <p:style>
-          <a:lnRef idx="2">
-            <a:schemeClr val="accent1">
-              <a:shade val="50000"/>
-            </a:schemeClr>
-          </a:lnRef>
-          <a:fillRef idx="1">
-            <a:schemeClr val="accent1"/>
-          </a:fillRef>
-          <a:effectRef idx="0">
-            <a:schemeClr val="accent1"/>
-          </a:effectRef>
-          <a:fontRef idx="minor">
-            <a:schemeClr val="lt1"/>
-          </a:fontRef>
-        </p:style>
-        <p:txBody>
-          <a:bodyPr rtlCol="0" anchor="ctr"/>
-          <a:lstStyle/>
-          <a:p>
-            <a:pPr algn="ctr"/>
-            <a:endParaRPr lang="fr-FR"/>
-          </a:p>
-        </p:txBody>
-      </p:sp>
-      <p:sp>
-        <p:nvSpPr>
-          <p:cNvPr id="15" name="ZoneTexte 14">
-            <a:extLst>
-              <a:ext uri="{FF2B5EF4-FFF2-40B4-BE49-F238E27FC236}">
-                <a16:creationId xmlns:a16="http://schemas.microsoft.com/office/drawing/2014/main" id="{5AC00C13-FEDB-E752-B145-0F5CA7117E9E}"/>
-              </a:ext>
-            </a:extLst>
-          </p:cNvPr>
-          <p:cNvSpPr txBox="1"/>
-          <p:nvPr/>
-        </p:nvSpPr>
-        <p:spPr>
-          <a:xfrm>
-            <a:off x="3741304" y="5797443"/>
-            <a:ext cx="2236305" cy="369332"/>
-          </a:xfrm>
-          <a:prstGeom prst="rect">
-            <a:avLst/>
-          </a:prstGeom>
-          <a:noFill/>
-        </p:spPr>
-        <p:txBody>
-          <a:bodyPr wrap="square" rtlCol="0">
-            <a:spAutoFit/>
-          </a:bodyPr>
-          <a:lstStyle/>
-          <a:p>
-            <a:r>
-              <a:rPr lang="fr-FR" dirty="0"/>
-              <a:t>Grosse influence de </a:t>
-            </a:r>
-          </a:p>
-        </p:txBody>
-      </p:sp>
-      <p:sp>
-        <p:nvSpPr>
-          <p:cNvPr id="18" name="ZoneTexte 17">
-            <a:extLst>
-              <a:ext uri="{FF2B5EF4-FFF2-40B4-BE49-F238E27FC236}">
-                <a16:creationId xmlns:a16="http://schemas.microsoft.com/office/drawing/2014/main" id="{BA1EA8DF-161C-64E8-8196-DA5F147FF5EC}"/>
-              </a:ext>
-            </a:extLst>
-          </p:cNvPr>
-          <p:cNvSpPr txBox="1"/>
-          <p:nvPr/>
-        </p:nvSpPr>
-        <p:spPr>
-          <a:xfrm>
-            <a:off x="3379479" y="5013139"/>
-            <a:ext cx="1967948" cy="369332"/>
-          </a:xfrm>
-          <a:prstGeom prst="rect">
-            <a:avLst/>
-          </a:prstGeom>
-          <a:noFill/>
-        </p:spPr>
-        <p:txBody>
-          <a:bodyPr wrap="square" rtlCol="0">
-            <a:spAutoFit/>
-          </a:bodyPr>
-          <a:lstStyle/>
-          <a:p>
-            <a:r>
-              <a:rPr lang="fr-FR" dirty="0"/>
-              <a:t>sur notre surface</a:t>
-            </a:r>
-          </a:p>
-        </p:txBody>
-      </p:sp>
-      <p:sp>
-        <p:nvSpPr>
-          <p:cNvPr id="19" name="ZoneTexte 18">
-            <a:extLst>
-              <a:ext uri="{FF2B5EF4-FFF2-40B4-BE49-F238E27FC236}">
-                <a16:creationId xmlns:a16="http://schemas.microsoft.com/office/drawing/2014/main" id="{B4AD5A5C-4F7F-A8B2-3509-81B30782BBEB}"/>
-              </a:ext>
-            </a:extLst>
-          </p:cNvPr>
-          <p:cNvSpPr txBox="1"/>
-          <p:nvPr/>
-        </p:nvSpPr>
-        <p:spPr>
-          <a:xfrm>
-            <a:off x="4193693" y="3128151"/>
-            <a:ext cx="1236846" cy="400110"/>
-          </a:xfrm>
-          <a:prstGeom prst="rect">
-            <a:avLst/>
-          </a:prstGeom>
-          <a:noFill/>
-        </p:spPr>
-        <p:txBody>
-          <a:bodyPr wrap="square" rtlCol="0">
-            <a:spAutoFit/>
-          </a:bodyPr>
-          <a:lstStyle/>
-          <a:p>
-            <a:r>
-              <a:rPr lang="fr-FR" sz="2000" dirty="0"/>
-              <a:t>Résultats</a:t>
-            </a:r>
-          </a:p>
-        </p:txBody>
-      </p:sp>
-      <p:pic>
-        <p:nvPicPr>
-          <p:cNvPr id="21" name="Image 20">
-            <a:extLst>
-              <a:ext uri="{FF2B5EF4-FFF2-40B4-BE49-F238E27FC236}">
-                <a16:creationId xmlns:a16="http://schemas.microsoft.com/office/drawing/2014/main" id="{E3A8B4BE-5F39-2D04-B900-3345B38CFABA}"/>
-              </a:ext>
-            </a:extLst>
-          </p:cNvPr>
-          <p:cNvPicPr>
-            <a:picLocks noChangeAspect="1"/>
-          </p:cNvPicPr>
-          <p:nvPr/>
-        </p:nvPicPr>
-        <p:blipFill>
-          <a:blip r:embed="rId4"/>
-          <a:stretch>
-            <a:fillRect/>
-          </a:stretch>
-        </p:blipFill>
-        <p:spPr>
-          <a:xfrm>
-            <a:off x="2879798" y="5043492"/>
-            <a:ext cx="499681" cy="345933"/>
-          </a:xfrm>
-          <a:prstGeom prst="rect">
-            <a:avLst/>
-          </a:prstGeom>
-        </p:spPr>
-      </p:pic>
-    </p:spTree>
-    <p:extLst>
-      <p:ext uri="{BB962C8B-B14F-4D97-AF65-F5344CB8AC3E}">
-        <p14:creationId xmlns:p14="http://schemas.microsoft.com/office/powerpoint/2010/main" val="2060116456"/>
       </p:ext>
     </p:extLst>
   </p:cSld>
@@ -9141,12 +9187,59 @@
           <a:chExt cx="0" cy="0"/>
         </a:xfrm>
       </p:grpSpPr>
+      <p:pic>
+        <p:nvPicPr>
+          <p:cNvPr id="16" name="Picture 2">
+            <a:extLst>
+              <a:ext uri="{FF2B5EF4-FFF2-40B4-BE49-F238E27FC236}">
+                <a16:creationId xmlns:a16="http://schemas.microsoft.com/office/drawing/2014/main" id="{3F540497-512B-81EE-EF98-4CBC9811E2F4}"/>
+              </a:ext>
+            </a:extLst>
+          </p:cNvPr>
+          <p:cNvPicPr>
+            <a:picLocks noChangeAspect="1" noChangeArrowheads="1"/>
+          </p:cNvPicPr>
+          <p:nvPr/>
+        </p:nvPicPr>
+        <p:blipFill>
+          <a:blip r:embed="rId2">
+            <a:extLst>
+              <a:ext uri="{28A0092B-C50C-407E-A947-70E740481C1C}">
+                <a14:useLocalDpi xmlns:a14="http://schemas.microsoft.com/office/drawing/2010/main" val="0"/>
+              </a:ext>
+            </a:extLst>
+          </a:blip>
+          <a:srcRect/>
+          <a:stretch>
+            <a:fillRect/>
+          </a:stretch>
+        </p:blipFill>
+        <p:spPr bwMode="auto">
+          <a:xfrm>
+            <a:off x="2121018" y="3510411"/>
+            <a:ext cx="5399372" cy="2185544"/>
+          </a:xfrm>
+          <a:prstGeom prst="rect">
+            <a:avLst/>
+          </a:prstGeom>
+          <a:noFill/>
+          <a:extLst>
+            <a:ext uri="{909E8E84-426E-40DD-AFC4-6F175D3DCCD1}">
+              <a14:hiddenFill xmlns:a14="http://schemas.microsoft.com/office/drawing/2010/main">
+                <a:solidFill>
+                  <a:srgbClr val="FFFFFF"/>
+                </a:solidFill>
+              </a14:hiddenFill>
+            </a:ext>
+          </a:extLst>
+        </p:spPr>
+      </p:pic>
       <p:sp>
         <p:nvSpPr>
           <p:cNvPr id="2" name="Titre 1">
             <a:extLst>
               <a:ext uri="{FF2B5EF4-FFF2-40B4-BE49-F238E27FC236}">
-                <a16:creationId xmlns:a16="http://schemas.microsoft.com/office/drawing/2014/main" id="{E75B0DC2-FC40-3339-E108-8207A88129A5}"/>
+                <a16:creationId xmlns:a16="http://schemas.microsoft.com/office/drawing/2014/main" id="{2327E90D-33B7-2CED-F37A-3AA68301A1EC}"/>
               </a:ext>
             </a:extLst>
           </p:cNvPr>
@@ -9157,24 +9250,39 @@
             <p:ph type="title"/>
           </p:nvPr>
         </p:nvSpPr>
-        <p:spPr/>
-        <p:txBody>
-          <a:bodyPr/>
-          <a:lstStyle/>
-          <a:p>
-            <a:r>
-              <a:rPr lang="fr-FR" dirty="0"/>
-              <a:t>Bonus (si assez de temps)</a:t>
+        <p:spPr>
+          <a:xfrm>
+            <a:off x="549743" y="746238"/>
+            <a:ext cx="8596668" cy="1320800"/>
+          </a:xfrm>
+        </p:spPr>
+        <p:txBody>
+          <a:bodyPr>
+            <a:normAutofit/>
+          </a:bodyPr>
+          <a:lstStyle/>
+          <a:p>
+            <a:pPr algn="ctr"/>
+            <a:r>
+              <a:rPr lang="fr-FR" sz="2800" b="1" u="sng" dirty="0">
+                <a:solidFill>
+                  <a:schemeClr val="tx1">
+                    <a:lumMod val="75000"/>
+                    <a:lumOff val="25000"/>
+                  </a:schemeClr>
+                </a:solidFill>
+              </a:rPr>
+              <a:t>Projection sur la base des Polynômes de Zernike</a:t>
             </a:r>
           </a:p>
         </p:txBody>
       </p:sp>
       <p:pic>
         <p:nvPicPr>
-          <p:cNvPr id="5" name="Image 4">
+          <p:cNvPr id="4" name="Image 3">
             <a:extLst>
               <a:ext uri="{FF2B5EF4-FFF2-40B4-BE49-F238E27FC236}">
-                <a16:creationId xmlns:a16="http://schemas.microsoft.com/office/drawing/2014/main" id="{4A34716A-52C0-5D1D-D118-0F4457513343}"/>
+                <a16:creationId xmlns:a16="http://schemas.microsoft.com/office/drawing/2014/main" id="{52DF1041-F812-DB5E-7F60-9D990FCEEC37}"/>
               </a:ext>
             </a:extLst>
           </p:cNvPr>
@@ -9184,21 +9292,447 @@
           <p:nvPr/>
         </p:nvPicPr>
         <p:blipFill>
-          <a:blip r:embed="rId2">
-            <a:extLst>
-              <a:ext uri="{28A0092B-C50C-407E-A947-70E740481C1C}">
-                <a14:useLocalDpi xmlns:a14="http://schemas.microsoft.com/office/drawing/2010/main" val="0"/>
-              </a:ext>
-            </a:extLst>
-          </a:blip>
+          <a:blip r:embed="rId3"/>
           <a:stretch>
             <a:fillRect/>
           </a:stretch>
         </p:blipFill>
         <p:spPr>
           <a:xfrm>
-            <a:off x="677334" y="1485895"/>
-            <a:ext cx="5852172" cy="4389129"/>
+            <a:off x="814578" y="1887859"/>
+            <a:ext cx="2847157" cy="769035"/>
+          </a:xfrm>
+          <a:prstGeom prst="rect">
+            <a:avLst/>
+          </a:prstGeom>
+        </p:spPr>
+      </p:pic>
+      <p:sp>
+        <p:nvSpPr>
+          <p:cNvPr id="5" name="ZoneTexte 4">
+            <a:extLst>
+              <a:ext uri="{FF2B5EF4-FFF2-40B4-BE49-F238E27FC236}">
+                <a16:creationId xmlns:a16="http://schemas.microsoft.com/office/drawing/2014/main" id="{FD0367DB-76C4-DBFF-5015-505FD3A56C85}"/>
+              </a:ext>
+            </a:extLst>
+          </p:cNvPr>
+          <p:cNvSpPr txBox="1"/>
+          <p:nvPr/>
+        </p:nvSpPr>
+        <p:spPr>
+          <a:xfrm>
+            <a:off x="1157120" y="2656894"/>
+            <a:ext cx="1864998" cy="369332"/>
+          </a:xfrm>
+          <a:prstGeom prst="rect">
+            <a:avLst/>
+          </a:prstGeom>
+          <a:noFill/>
+        </p:spPr>
+        <p:txBody>
+          <a:bodyPr wrap="none" rtlCol="0">
+            <a:spAutoFit/>
+          </a:bodyPr>
+          <a:lstStyle/>
+          <a:p>
+            <a:r>
+              <a:rPr lang="fr-FR" dirty="0"/>
+              <a:t>Produit scalaire</a:t>
+            </a:r>
+          </a:p>
+        </p:txBody>
+      </p:sp>
+      <p:sp>
+        <p:nvSpPr>
+          <p:cNvPr id="7" name="ZoneTexte 6">
+            <a:extLst>
+              <a:ext uri="{FF2B5EF4-FFF2-40B4-BE49-F238E27FC236}">
+                <a16:creationId xmlns:a16="http://schemas.microsoft.com/office/drawing/2014/main" id="{1E5779A9-B9BC-6A19-2D0A-C9ADA71B213B}"/>
+              </a:ext>
+            </a:extLst>
+          </p:cNvPr>
+          <p:cNvSpPr txBox="1"/>
+          <p:nvPr/>
+        </p:nvSpPr>
+        <p:spPr>
+          <a:xfrm>
+            <a:off x="4418038" y="3586471"/>
+            <a:ext cx="788156" cy="369332"/>
+          </a:xfrm>
+          <a:prstGeom prst="rect">
+            <a:avLst/>
+          </a:prstGeom>
+          <a:noFill/>
+        </p:spPr>
+        <p:txBody>
+          <a:bodyPr wrap="square" rtlCol="0">
+            <a:spAutoFit/>
+          </a:bodyPr>
+          <a:lstStyle/>
+          <a:p>
+            <a:r>
+              <a:rPr lang="fr-FR" dirty="0"/>
+              <a:t>0,068</a:t>
+            </a:r>
+          </a:p>
+        </p:txBody>
+      </p:sp>
+      <p:sp>
+        <p:nvSpPr>
+          <p:cNvPr id="8" name="ZoneTexte 7">
+            <a:extLst>
+              <a:ext uri="{FF2B5EF4-FFF2-40B4-BE49-F238E27FC236}">
+                <a16:creationId xmlns:a16="http://schemas.microsoft.com/office/drawing/2014/main" id="{ED6C262C-8187-7DB3-80B2-6718401B5791}"/>
+              </a:ext>
+            </a:extLst>
+          </p:cNvPr>
+          <p:cNvSpPr txBox="1"/>
+          <p:nvPr/>
+        </p:nvSpPr>
+        <p:spPr>
+          <a:xfrm>
+            <a:off x="3926958" y="3875407"/>
+            <a:ext cx="1864999" cy="369332"/>
+          </a:xfrm>
+          <a:prstGeom prst="rect">
+            <a:avLst/>
+          </a:prstGeom>
+          <a:noFill/>
+        </p:spPr>
+        <p:txBody>
+          <a:bodyPr wrap="square" rtlCol="0">
+            <a:spAutoFit/>
+          </a:bodyPr>
+          <a:lstStyle/>
+          <a:p>
+            <a:r>
+              <a:rPr lang="fr-FR" dirty="0"/>
+              <a:t>-0,019	-0,008</a:t>
+            </a:r>
+          </a:p>
+        </p:txBody>
+      </p:sp>
+      <p:sp>
+        <p:nvSpPr>
+          <p:cNvPr id="10" name="ZoneTexte 9">
+            <a:extLst>
+              <a:ext uri="{FF2B5EF4-FFF2-40B4-BE49-F238E27FC236}">
+                <a16:creationId xmlns:a16="http://schemas.microsoft.com/office/drawing/2014/main" id="{24F40267-0271-19A2-8991-6E14815B06C3}"/>
+              </a:ext>
+            </a:extLst>
+          </p:cNvPr>
+          <p:cNvSpPr txBox="1"/>
+          <p:nvPr/>
+        </p:nvSpPr>
+        <p:spPr>
+          <a:xfrm>
+            <a:off x="3446618" y="4229060"/>
+            <a:ext cx="2825678" cy="369332"/>
+          </a:xfrm>
+          <a:prstGeom prst="rect">
+            <a:avLst/>
+          </a:prstGeom>
+          <a:noFill/>
+        </p:spPr>
+        <p:txBody>
+          <a:bodyPr wrap="square" rtlCol="0">
+            <a:spAutoFit/>
+          </a:bodyPr>
+          <a:lstStyle/>
+          <a:p>
+            <a:r>
+              <a:rPr lang="fr-FR" dirty="0"/>
+              <a:t>-0,017	0,007	0,0002</a:t>
+            </a:r>
+          </a:p>
+        </p:txBody>
+      </p:sp>
+      <p:sp>
+        <p:nvSpPr>
+          <p:cNvPr id="11" name="ZoneTexte 10">
+            <a:extLst>
+              <a:ext uri="{FF2B5EF4-FFF2-40B4-BE49-F238E27FC236}">
+                <a16:creationId xmlns:a16="http://schemas.microsoft.com/office/drawing/2014/main" id="{F371E552-F9E0-F21D-1535-219FD302E971}"/>
+              </a:ext>
+            </a:extLst>
+          </p:cNvPr>
+          <p:cNvSpPr txBox="1"/>
+          <p:nvPr/>
+        </p:nvSpPr>
+        <p:spPr>
+          <a:xfrm>
+            <a:off x="2941593" y="4598392"/>
+            <a:ext cx="3835728" cy="369332"/>
+          </a:xfrm>
+          <a:prstGeom prst="rect">
+            <a:avLst/>
+          </a:prstGeom>
+          <a:noFill/>
+        </p:spPr>
+        <p:txBody>
+          <a:bodyPr wrap="square" rtlCol="0">
+            <a:spAutoFit/>
+          </a:bodyPr>
+          <a:lstStyle/>
+          <a:p>
+            <a:r>
+              <a:rPr lang="fr-FR" dirty="0"/>
+              <a:t>0,010	-0,023	0,010	-0,014</a:t>
+            </a:r>
+          </a:p>
+        </p:txBody>
+      </p:sp>
+      <p:sp>
+        <p:nvSpPr>
+          <p:cNvPr id="12" name="ZoneTexte 11">
+            <a:extLst>
+              <a:ext uri="{FF2B5EF4-FFF2-40B4-BE49-F238E27FC236}">
+                <a16:creationId xmlns:a16="http://schemas.microsoft.com/office/drawing/2014/main" id="{E764C544-A81E-A8FA-378B-B2D5FA476A6B}"/>
+              </a:ext>
+            </a:extLst>
+          </p:cNvPr>
+          <p:cNvSpPr txBox="1"/>
+          <p:nvPr/>
+        </p:nvSpPr>
+        <p:spPr>
+          <a:xfrm>
+            <a:off x="2542158" y="4957291"/>
+            <a:ext cx="4539916" cy="369332"/>
+          </a:xfrm>
+          <a:prstGeom prst="rect">
+            <a:avLst/>
+          </a:prstGeom>
+          <a:noFill/>
+        </p:spPr>
+        <p:txBody>
+          <a:bodyPr wrap="square" rtlCol="0">
+            <a:spAutoFit/>
+          </a:bodyPr>
+          <a:lstStyle/>
+          <a:p>
+            <a:r>
+              <a:rPr lang="fr-FR" dirty="0"/>
+              <a:t>0,006	-0,048	0,094	0,012	-0,004</a:t>
+            </a:r>
+          </a:p>
+        </p:txBody>
+      </p:sp>
+      <p:sp>
+        <p:nvSpPr>
+          <p:cNvPr id="13" name="ZoneTexte 12">
+            <a:extLst>
+              <a:ext uri="{FF2B5EF4-FFF2-40B4-BE49-F238E27FC236}">
+                <a16:creationId xmlns:a16="http://schemas.microsoft.com/office/drawing/2014/main" id="{7BB321E5-7584-4327-590F-1A37D84033FF}"/>
+              </a:ext>
+            </a:extLst>
+          </p:cNvPr>
+          <p:cNvSpPr txBox="1"/>
+          <p:nvPr/>
+        </p:nvSpPr>
+        <p:spPr>
+          <a:xfrm>
+            <a:off x="2121018" y="5312958"/>
+            <a:ext cx="5325979" cy="369332"/>
+          </a:xfrm>
+          <a:prstGeom prst="rect">
+            <a:avLst/>
+          </a:prstGeom>
+          <a:noFill/>
+        </p:spPr>
+        <p:txBody>
+          <a:bodyPr wrap="square" rtlCol="0">
+            <a:spAutoFit/>
+          </a:bodyPr>
+          <a:lstStyle/>
+          <a:p>
+            <a:r>
+              <a:rPr lang="fr-FR" dirty="0"/>
+              <a:t>0,0006	0,048	-0,117	0,023	-0,051	0,017</a:t>
+            </a:r>
+          </a:p>
+        </p:txBody>
+      </p:sp>
+      <p:sp>
+        <p:nvSpPr>
+          <p:cNvPr id="14" name="Rectangle 13">
+            <a:extLst>
+              <a:ext uri="{FF2B5EF4-FFF2-40B4-BE49-F238E27FC236}">
+                <a16:creationId xmlns:a16="http://schemas.microsoft.com/office/drawing/2014/main" id="{39FA6855-75BF-BB3C-9F17-3AC121C9F865}"/>
+              </a:ext>
+            </a:extLst>
+          </p:cNvPr>
+          <p:cNvSpPr/>
+          <p:nvPr/>
+        </p:nvSpPr>
+        <p:spPr>
+          <a:xfrm>
+            <a:off x="3949644" y="5307712"/>
+            <a:ext cx="834364" cy="364145"/>
+          </a:xfrm>
+          <a:prstGeom prst="rect">
+            <a:avLst/>
+          </a:prstGeom>
+          <a:noFill/>
+          <a:ln w="38100">
+            <a:solidFill>
+              <a:srgbClr val="FF0000"/>
+            </a:solidFill>
+          </a:ln>
+        </p:spPr>
+        <p:style>
+          <a:lnRef idx="2">
+            <a:schemeClr val="accent1">
+              <a:shade val="50000"/>
+            </a:schemeClr>
+          </a:lnRef>
+          <a:fillRef idx="1">
+            <a:schemeClr val="accent1"/>
+          </a:fillRef>
+          <a:effectRef idx="0">
+            <a:schemeClr val="accent1"/>
+          </a:effectRef>
+          <a:fontRef idx="minor">
+            <a:schemeClr val="lt1"/>
+          </a:fontRef>
+        </p:style>
+        <p:txBody>
+          <a:bodyPr rtlCol="0" anchor="ctr"/>
+          <a:lstStyle/>
+          <a:p>
+            <a:pPr algn="ctr"/>
+            <a:endParaRPr lang="fr-FR"/>
+          </a:p>
+        </p:txBody>
+      </p:sp>
+      <p:sp>
+        <p:nvSpPr>
+          <p:cNvPr id="15" name="ZoneTexte 14">
+            <a:extLst>
+              <a:ext uri="{FF2B5EF4-FFF2-40B4-BE49-F238E27FC236}">
+                <a16:creationId xmlns:a16="http://schemas.microsoft.com/office/drawing/2014/main" id="{5AC00C13-FEDB-E752-B145-0F5CA7117E9E}"/>
+              </a:ext>
+            </a:extLst>
+          </p:cNvPr>
+          <p:cNvSpPr txBox="1"/>
+          <p:nvPr/>
+        </p:nvSpPr>
+        <p:spPr>
+          <a:xfrm>
+            <a:off x="3741304" y="5797443"/>
+            <a:ext cx="2236305" cy="369332"/>
+          </a:xfrm>
+          <a:prstGeom prst="rect">
+            <a:avLst/>
+          </a:prstGeom>
+          <a:noFill/>
+        </p:spPr>
+        <p:txBody>
+          <a:bodyPr wrap="square" rtlCol="0">
+            <a:spAutoFit/>
+          </a:bodyPr>
+          <a:lstStyle/>
+          <a:p>
+            <a:r>
+              <a:rPr lang="fr-FR" dirty="0"/>
+              <a:t>Grosse influence de </a:t>
+            </a:r>
+          </a:p>
+        </p:txBody>
+      </p:sp>
+      <p:sp>
+        <p:nvSpPr>
+          <p:cNvPr id="18" name="ZoneTexte 17">
+            <a:extLst>
+              <a:ext uri="{FF2B5EF4-FFF2-40B4-BE49-F238E27FC236}">
+                <a16:creationId xmlns:a16="http://schemas.microsoft.com/office/drawing/2014/main" id="{BA1EA8DF-161C-64E8-8196-DA5F147FF5EC}"/>
+              </a:ext>
+            </a:extLst>
+          </p:cNvPr>
+          <p:cNvSpPr txBox="1"/>
+          <p:nvPr/>
+        </p:nvSpPr>
+        <p:spPr>
+          <a:xfrm>
+            <a:off x="6463023" y="5841591"/>
+            <a:ext cx="1967948" cy="369332"/>
+          </a:xfrm>
+          <a:prstGeom prst="rect">
+            <a:avLst/>
+          </a:prstGeom>
+          <a:noFill/>
+        </p:spPr>
+        <p:txBody>
+          <a:bodyPr wrap="square" rtlCol="0">
+            <a:spAutoFit/>
+          </a:bodyPr>
+          <a:lstStyle/>
+          <a:p>
+            <a:r>
+              <a:rPr lang="fr-FR" dirty="0"/>
+              <a:t>sur notre surface</a:t>
+            </a:r>
+          </a:p>
+        </p:txBody>
+      </p:sp>
+      <p:sp>
+        <p:nvSpPr>
+          <p:cNvPr id="19" name="ZoneTexte 18">
+            <a:extLst>
+              <a:ext uri="{FF2B5EF4-FFF2-40B4-BE49-F238E27FC236}">
+                <a16:creationId xmlns:a16="http://schemas.microsoft.com/office/drawing/2014/main" id="{B4AD5A5C-4F7F-A8B2-3509-81B30782BBEB}"/>
+              </a:ext>
+            </a:extLst>
+          </p:cNvPr>
+          <p:cNvSpPr txBox="1"/>
+          <p:nvPr/>
+        </p:nvSpPr>
+        <p:spPr>
+          <a:xfrm>
+            <a:off x="4193693" y="3128151"/>
+            <a:ext cx="1236846" cy="400110"/>
+          </a:xfrm>
+          <a:prstGeom prst="rect">
+            <a:avLst/>
+          </a:prstGeom>
+          <a:noFill/>
+        </p:spPr>
+        <p:txBody>
+          <a:bodyPr wrap="square" rtlCol="0">
+            <a:spAutoFit/>
+          </a:bodyPr>
+          <a:lstStyle/>
+          <a:p>
+            <a:r>
+              <a:rPr lang="fr-FR" sz="2000" dirty="0"/>
+              <a:t>Résultats</a:t>
+            </a:r>
+          </a:p>
+        </p:txBody>
+      </p:sp>
+      <p:pic>
+        <p:nvPicPr>
+          <p:cNvPr id="21" name="Image 20">
+            <a:extLst>
+              <a:ext uri="{FF2B5EF4-FFF2-40B4-BE49-F238E27FC236}">
+                <a16:creationId xmlns:a16="http://schemas.microsoft.com/office/drawing/2014/main" id="{E3A8B4BE-5F39-2D04-B900-3345B38CFABA}"/>
+              </a:ext>
+            </a:extLst>
+          </p:cNvPr>
+          <p:cNvPicPr>
+            <a:picLocks noChangeAspect="1"/>
+          </p:cNvPicPr>
+          <p:nvPr/>
+        </p:nvPicPr>
+        <p:blipFill>
+          <a:blip r:embed="rId4"/>
+          <a:stretch>
+            <a:fillRect/>
+          </a:stretch>
+        </p:blipFill>
+        <p:spPr>
+          <a:xfrm>
+            <a:off x="5846159" y="5864990"/>
+            <a:ext cx="499681" cy="345933"/>
           </a:xfrm>
           <a:prstGeom prst="rect">
             <a:avLst/>
@@ -9208,7 +9742,7 @@
     </p:spTree>
     <p:extLst>
       <p:ext uri="{BB962C8B-B14F-4D97-AF65-F5344CB8AC3E}">
-        <p14:creationId xmlns:p14="http://schemas.microsoft.com/office/powerpoint/2010/main" val="3187547115"/>
+        <p14:creationId xmlns:p14="http://schemas.microsoft.com/office/powerpoint/2010/main" val="2060116456"/>
       </p:ext>
     </p:extLst>
   </p:cSld>
@@ -9298,6 +9832,100 @@
     <p:extLst>
       <p:ext uri="{BB962C8B-B14F-4D97-AF65-F5344CB8AC3E}">
         <p14:creationId xmlns:p14="http://schemas.microsoft.com/office/powerpoint/2010/main" val="3232331709"/>
+      </p:ext>
+    </p:extLst>
+  </p:cSld>
+  <p:clrMapOvr>
+    <a:masterClrMapping/>
+  </p:clrMapOvr>
+</p:sld>
+</file>
+
+<file path=ppt/slides/slide20.xml><?xml version="1.0" encoding="utf-8"?>
+<p:sld xmlns:a="http://schemas.openxmlformats.org/drawingml/2006/main" xmlns:r="http://schemas.openxmlformats.org/officeDocument/2006/relationships" xmlns:p="http://schemas.openxmlformats.org/presentationml/2006/main">
+  <p:cSld>
+    <p:spTree>
+      <p:nvGrpSpPr>
+        <p:cNvPr id="1" name=""/>
+        <p:cNvGrpSpPr/>
+        <p:nvPr/>
+      </p:nvGrpSpPr>
+      <p:grpSpPr>
+        <a:xfrm>
+          <a:off x="0" y="0"/>
+          <a:ext cx="0" cy="0"/>
+          <a:chOff x="0" y="0"/>
+          <a:chExt cx="0" cy="0"/>
+        </a:xfrm>
+      </p:grpSpPr>
+      <p:sp>
+        <p:nvSpPr>
+          <p:cNvPr id="2" name="Titre 1">
+            <a:extLst>
+              <a:ext uri="{FF2B5EF4-FFF2-40B4-BE49-F238E27FC236}">
+                <a16:creationId xmlns:a16="http://schemas.microsoft.com/office/drawing/2014/main" id="{E75B0DC2-FC40-3339-E108-8207A88129A5}"/>
+              </a:ext>
+            </a:extLst>
+          </p:cNvPr>
+          <p:cNvSpPr>
+            <a:spLocks noGrp="1"/>
+          </p:cNvSpPr>
+          <p:nvPr>
+            <p:ph type="title"/>
+          </p:nvPr>
+        </p:nvSpPr>
+        <p:spPr/>
+        <p:txBody>
+          <a:bodyPr/>
+          <a:lstStyle/>
+          <a:p>
+            <a:r>
+              <a:rPr lang="fr-FR" dirty="0"/>
+              <a:t>Bonus (si assez de temps)</a:t>
+            </a:r>
+          </a:p>
+        </p:txBody>
+      </p:sp>
+      <p:pic>
+        <p:nvPicPr>
+          <p:cNvPr id="5" name="Image 4">
+            <a:extLst>
+              <a:ext uri="{FF2B5EF4-FFF2-40B4-BE49-F238E27FC236}">
+                <a16:creationId xmlns:a16="http://schemas.microsoft.com/office/drawing/2014/main" id="{4A34716A-52C0-5D1D-D118-0F4457513343}"/>
+              </a:ext>
+            </a:extLst>
+          </p:cNvPr>
+          <p:cNvPicPr>
+            <a:picLocks noChangeAspect="1"/>
+          </p:cNvPicPr>
+          <p:nvPr/>
+        </p:nvPicPr>
+        <p:blipFill>
+          <a:blip r:embed="rId2">
+            <a:extLst>
+              <a:ext uri="{28A0092B-C50C-407E-A947-70E740481C1C}">
+                <a14:useLocalDpi xmlns:a14="http://schemas.microsoft.com/office/drawing/2010/main" val="0"/>
+              </a:ext>
+            </a:extLst>
+          </a:blip>
+          <a:stretch>
+            <a:fillRect/>
+          </a:stretch>
+        </p:blipFill>
+        <p:spPr>
+          <a:xfrm>
+            <a:off x="677334" y="1485895"/>
+            <a:ext cx="5852172" cy="4389129"/>
+          </a:xfrm>
+          <a:prstGeom prst="rect">
+            <a:avLst/>
+          </a:prstGeom>
+        </p:spPr>
+      </p:pic>
+    </p:spTree>
+    <p:extLst>
+      <p:ext uri="{BB962C8B-B14F-4D97-AF65-F5344CB8AC3E}">
+        <p14:creationId xmlns:p14="http://schemas.microsoft.com/office/powerpoint/2010/main" val="3187547115"/>
       </p:ext>
     </p:extLst>
   </p:cSld>
@@ -10678,7 +11306,7 @@
         </p:blipFill>
         <p:spPr bwMode="auto">
           <a:xfrm>
-            <a:off x="512826" y="2694432"/>
+            <a:off x="512826" y="1520373"/>
             <a:ext cx="2505456" cy="3340608"/>
           </a:xfrm>
           <a:prstGeom prst="rect">
@@ -10725,7 +11353,7 @@
         </p:blipFill>
         <p:spPr bwMode="auto">
           <a:xfrm>
-            <a:off x="3430524" y="2694432"/>
+            <a:off x="3430524" y="1520373"/>
             <a:ext cx="2505456" cy="3340608"/>
           </a:xfrm>
           <a:prstGeom prst="rect">
@@ -10772,7 +11400,7 @@
         </p:blipFill>
         <p:spPr bwMode="auto">
           <a:xfrm>
-            <a:off x="6348222" y="2694432"/>
+            <a:off x="6348222" y="1520373"/>
             <a:ext cx="2505456" cy="3340608"/>
           </a:xfrm>
           <a:prstGeom prst="rect">
@@ -10806,7 +11434,7 @@
         </p:nvCxnSpPr>
         <p:spPr>
           <a:xfrm>
-            <a:off x="382555" y="6410131"/>
+            <a:off x="382555" y="5236072"/>
             <a:ext cx="8471123" cy="0"/>
           </a:xfrm>
           <a:prstGeom prst="straightConnector1">
@@ -10845,7 +11473,7 @@
         </p:nvSpPr>
         <p:spPr>
           <a:xfrm>
-            <a:off x="8853678" y="6035040"/>
+            <a:off x="8853678" y="4860981"/>
             <a:ext cx="276038" cy="369332"/>
           </a:xfrm>
           <a:prstGeom prst="rect">
@@ -10882,7 +11510,7 @@
         </p:nvCxnSpPr>
         <p:spPr>
           <a:xfrm>
-            <a:off x="512826" y="6316824"/>
+            <a:off x="512826" y="5142765"/>
             <a:ext cx="0" cy="205274"/>
           </a:xfrm>
           <a:prstGeom prst="line">
@@ -10918,7 +11546,7 @@
         </p:nvSpPr>
         <p:spPr>
           <a:xfrm>
-            <a:off x="512826" y="6430739"/>
+            <a:off x="512826" y="5256680"/>
             <a:ext cx="306494" cy="369332"/>
           </a:xfrm>
           <a:prstGeom prst="rect">
@@ -10935,64 +11563,6 @@
             <a:r>
               <a:rPr lang="fr-FR" dirty="0"/>
               <a:t>0</a:t>
-            </a:r>
-          </a:p>
-        </p:txBody>
-      </p:sp>
-      <p:sp>
-        <p:nvSpPr>
-          <p:cNvPr id="10" name="Espace réservé du contenu 2">
-            <a:extLst>
-              <a:ext uri="{FF2B5EF4-FFF2-40B4-BE49-F238E27FC236}">
-                <a16:creationId xmlns:a16="http://schemas.microsoft.com/office/drawing/2014/main" id="{E81E16B7-CC43-A1BB-EC49-0F3E1E56A6CB}"/>
-              </a:ext>
-            </a:extLst>
-          </p:cNvPr>
-          <p:cNvSpPr>
-            <a:spLocks noGrp="1"/>
-          </p:cNvSpPr>
-          <p:nvPr>
-            <p:ph idx="1"/>
-          </p:nvPr>
-        </p:nvSpPr>
-        <p:spPr>
-          <a:xfrm>
-            <a:off x="512826" y="1119118"/>
-            <a:ext cx="4292231" cy="1149140"/>
-          </a:xfrm>
-        </p:spPr>
-        <p:txBody>
-          <a:bodyPr>
-            <a:normAutofit lnSpcReduction="10000"/>
-          </a:bodyPr>
-          <a:lstStyle/>
-          <a:p>
-            <a:pPr marL="0" indent="0">
-              <a:buNone/>
-            </a:pPr>
-            <a:r>
-              <a:rPr lang="fr-FR" b="1" u="sng" dirty="0"/>
-              <a:t>Deux phénomènes entrent en jeu ici :</a:t>
-            </a:r>
-          </a:p>
-          <a:p>
-            <a:pPr>
-              <a:buFontTx/>
-              <a:buChar char="-"/>
-            </a:pPr>
-            <a:r>
-              <a:rPr lang="fr-FR" dirty="0"/>
-              <a:t>La réfraction</a:t>
-            </a:r>
-          </a:p>
-          <a:p>
-            <a:pPr>
-              <a:buFontTx/>
-              <a:buChar char="-"/>
-            </a:pPr>
-            <a:r>
-              <a:rPr lang="fr-FR" dirty="0"/>
-              <a:t>La différence de temps de parcours</a:t>
             </a:r>
           </a:p>
         </p:txBody>
@@ -11138,48 +11708,12 @@
           </a:p>
         </p:txBody>
       </p:sp>
-      <p:pic>
-        <p:nvPicPr>
-          <p:cNvPr id="15" name="Image 14">
+      <p:sp>
+        <p:nvSpPr>
+          <p:cNvPr id="17" name="ZoneTexte 16">
             <a:extLst>
               <a:ext uri="{FF2B5EF4-FFF2-40B4-BE49-F238E27FC236}">
-                <a16:creationId xmlns:a16="http://schemas.microsoft.com/office/drawing/2014/main" id="{099FB1EF-B848-BC16-EFCE-1970EA482ED3}"/>
-              </a:ext>
-            </a:extLst>
-          </p:cNvPr>
-          <p:cNvPicPr>
-            <a:picLocks noChangeAspect="1"/>
-          </p:cNvPicPr>
-          <p:nvPr/>
-        </p:nvPicPr>
-        <p:blipFill>
-          <a:blip r:embed="rId5">
-            <a:extLst>
-              <a:ext uri="{28A0092B-C50C-407E-A947-70E740481C1C}">
-                <a14:useLocalDpi xmlns:a14="http://schemas.microsoft.com/office/drawing/2010/main" val="0"/>
-              </a:ext>
-            </a:extLst>
-          </a:blip>
-          <a:stretch>
-            <a:fillRect/>
-          </a:stretch>
-        </p:blipFill>
-        <p:spPr>
-          <a:xfrm>
-            <a:off x="5809725" y="1645441"/>
-            <a:ext cx="3936150" cy="797543"/>
-          </a:xfrm>
-          <a:prstGeom prst="rect">
-            <a:avLst/>
-          </a:prstGeom>
-        </p:spPr>
-      </p:pic>
-      <p:sp>
-        <p:nvSpPr>
-          <p:cNvPr id="16" name="ZoneTexte 15">
-            <a:extLst>
-              <a:ext uri="{FF2B5EF4-FFF2-40B4-BE49-F238E27FC236}">
-                <a16:creationId xmlns:a16="http://schemas.microsoft.com/office/drawing/2014/main" id="{F2772FAF-0342-2F85-2B4A-9E976EC38AB8}"/>
+                <a16:creationId xmlns:a16="http://schemas.microsoft.com/office/drawing/2014/main" id="{E1BC7958-EF56-43F0-ACEB-E8148D014562}"/>
               </a:ext>
             </a:extLst>
           </p:cNvPr>
@@ -11188,8 +11722,8 @@
         </p:nvSpPr>
         <p:spPr>
           <a:xfrm>
-            <a:off x="5193567" y="1288543"/>
-            <a:ext cx="3936149" cy="369332"/>
+            <a:off x="512826" y="1094199"/>
+            <a:ext cx="3708300" cy="369332"/>
           </a:xfrm>
           <a:prstGeom prst="rect">
             <a:avLst/>
@@ -11203,7 +11737,7 @@
           <a:lstStyle/>
           <a:p>
             <a:r>
-              <a:rPr lang="fr-FR" u="sng" dirty="0">
+              <a:rPr lang="fr-FR" b="1" u="sng" dirty="0">
                 <a:solidFill>
                   <a:schemeClr val="tx1">
                     <a:lumMod val="75000"/>
@@ -11211,49 +11745,65 @@
                   </a:schemeClr>
                 </a:solidFill>
               </a:rPr>
-              <a:t>Variation de y du à la réfraction :</a:t>
-            </a:r>
-          </a:p>
-        </p:txBody>
-      </p:sp>
-      <p:sp>
-        <p:nvSpPr>
-          <p:cNvPr id="17" name="ZoneTexte 16">
+              <a:t>Image observée :</a:t>
+            </a:r>
+          </a:p>
+        </p:txBody>
+      </p:sp>
+      <p:sp>
+        <p:nvSpPr>
+          <p:cNvPr id="20" name="Espace réservé du contenu 2">
             <a:extLst>
               <a:ext uri="{FF2B5EF4-FFF2-40B4-BE49-F238E27FC236}">
-                <a16:creationId xmlns:a16="http://schemas.microsoft.com/office/drawing/2014/main" id="{E1BC7958-EF56-43F0-ACEB-E8148D014562}"/>
+                <a16:creationId xmlns:a16="http://schemas.microsoft.com/office/drawing/2014/main" id="{C858EB64-0496-C444-75B0-89B43A421313}"/>
               </a:ext>
             </a:extLst>
           </p:cNvPr>
-          <p:cNvSpPr txBox="1"/>
-          <p:nvPr/>
-        </p:nvSpPr>
-        <p:spPr>
-          <a:xfrm>
-            <a:off x="512826" y="2268258"/>
-            <a:ext cx="3708300" cy="369332"/>
-          </a:xfrm>
-          <a:prstGeom prst="rect">
-            <a:avLst/>
-          </a:prstGeom>
-          <a:noFill/>
-        </p:spPr>
-        <p:txBody>
-          <a:bodyPr wrap="square" rtlCol="0">
-            <a:spAutoFit/>
+          <p:cNvSpPr>
+            <a:spLocks noGrp="1"/>
+          </p:cNvSpPr>
+          <p:nvPr>
+            <p:ph idx="1"/>
+          </p:nvPr>
+        </p:nvSpPr>
+        <p:spPr>
+          <a:xfrm>
+            <a:off x="512826" y="5626012"/>
+            <a:ext cx="4292231" cy="1149140"/>
+          </a:xfrm>
+        </p:spPr>
+        <p:txBody>
+          <a:bodyPr>
+            <a:normAutofit lnSpcReduction="10000"/>
           </a:bodyPr>
           <a:lstStyle/>
           <a:p>
-            <a:r>
-              <a:rPr lang="fr-FR" b="1" u="sng" dirty="0">
-                <a:solidFill>
-                  <a:schemeClr val="tx1">
-                    <a:lumMod val="75000"/>
-                    <a:lumOff val="25000"/>
-                  </a:schemeClr>
-                </a:solidFill>
-              </a:rPr>
-              <a:t>Image observée :</a:t>
+            <a:pPr marL="0" indent="0">
+              <a:buNone/>
+            </a:pPr>
+            <a:r>
+              <a:rPr lang="fr-FR" b="1" u="sng" dirty="0"/>
+              <a:t>Deux phénomènes entrent en jeu ici :</a:t>
+            </a:r>
+          </a:p>
+          <a:p>
+            <a:pPr>
+              <a:buFontTx/>
+              <a:buChar char="-"/>
+            </a:pPr>
+            <a:r>
+              <a:rPr lang="fr-FR" dirty="0"/>
+              <a:t>La réfraction</a:t>
+            </a:r>
+          </a:p>
+          <a:p>
+            <a:pPr>
+              <a:buFontTx/>
+              <a:buChar char="-"/>
+            </a:pPr>
+            <a:r>
+              <a:rPr lang="fr-FR" dirty="0"/>
+              <a:t>La différence de temps de parcours</a:t>
             </a:r>
           </a:p>
         </p:txBody>
@@ -11288,12 +11838,54 @@
           <a:chExt cx="0" cy="0"/>
         </a:xfrm>
       </p:grpSpPr>
+      <p:sp>
+        <p:nvSpPr>
+          <p:cNvPr id="4" name="ZoneTexte 3">
+            <a:extLst>
+              <a:ext uri="{FF2B5EF4-FFF2-40B4-BE49-F238E27FC236}">
+                <a16:creationId xmlns:a16="http://schemas.microsoft.com/office/drawing/2014/main" id="{BAF84D8F-21CB-8E77-5B9F-0D7963CE2378}"/>
+              </a:ext>
+            </a:extLst>
+          </p:cNvPr>
+          <p:cNvSpPr txBox="1"/>
+          <p:nvPr/>
+        </p:nvSpPr>
+        <p:spPr>
+          <a:xfrm>
+            <a:off x="4805057" y="1944969"/>
+            <a:ext cx="3936149" cy="369332"/>
+          </a:xfrm>
+          <a:prstGeom prst="rect">
+            <a:avLst/>
+          </a:prstGeom>
+          <a:noFill/>
+        </p:spPr>
+        <p:txBody>
+          <a:bodyPr wrap="square" rtlCol="0">
+            <a:spAutoFit/>
+          </a:bodyPr>
+          <a:lstStyle/>
+          <a:p>
+            <a:r>
+              <a:rPr lang="fr-FR" u="sng" dirty="0">
+                <a:solidFill>
+                  <a:schemeClr val="tx1">
+                    <a:lumMod val="75000"/>
+                    <a:lumOff val="25000"/>
+                  </a:schemeClr>
+                </a:solidFill>
+              </a:rPr>
+              <a:t>Variation de y du à la réfraction :</a:t>
+            </a:r>
+          </a:p>
+        </p:txBody>
+      </p:sp>
       <p:pic>
         <p:nvPicPr>
           <p:cNvPr id="5" name="Image 4">
             <a:extLst>
               <a:ext uri="{FF2B5EF4-FFF2-40B4-BE49-F238E27FC236}">
-                <a16:creationId xmlns:a16="http://schemas.microsoft.com/office/drawing/2014/main" id="{F6A54EA3-A0F6-192E-FCA9-BAF8EEC62E36}"/>
+                <a16:creationId xmlns:a16="http://schemas.microsoft.com/office/drawing/2014/main" id="{157F1B24-AE8D-D009-7762-7DBB5A3677B7}"/>
               </a:ext>
             </a:extLst>
           </p:cNvPr>
@@ -11302,7 +11894,7 @@
           </p:cNvPicPr>
           <p:nvPr/>
         </p:nvPicPr>
-        <p:blipFill rotWithShape="1">
+        <p:blipFill>
           <a:blip r:embed="rId2">
             <a:extLst>
               <a:ext uri="{28A0092B-C50C-407E-A947-70E740481C1C}">
@@ -11310,679 +11902,24 @@
               </a:ext>
             </a:extLst>
           </a:blip>
-          <a:srcRect l="12400" r="9829" b="10898"/>
-          <a:stretch/>
-        </p:blipFill>
-        <p:spPr>
-          <a:xfrm>
-            <a:off x="6121579" y="2132228"/>
-            <a:ext cx="3220279" cy="2767110"/>
-          </a:xfrm>
-          <a:prstGeom prst="rect">
-            <a:avLst/>
-          </a:prstGeom>
-        </p:spPr>
-      </p:pic>
-      <p:sp>
-        <p:nvSpPr>
-          <p:cNvPr id="2" name="Titre 1">
-            <a:extLst>
-              <a:ext uri="{FF2B5EF4-FFF2-40B4-BE49-F238E27FC236}">
-                <a16:creationId xmlns:a16="http://schemas.microsoft.com/office/drawing/2014/main" id="{129CD821-680E-497C-B441-FD2D5F7803AA}"/>
-              </a:ext>
-            </a:extLst>
-          </p:cNvPr>
-          <p:cNvSpPr>
-            <a:spLocks noGrp="1"/>
-          </p:cNvSpPr>
-          <p:nvPr>
-            <p:ph type="title"/>
-          </p:nvPr>
-        </p:nvSpPr>
-        <p:spPr>
-          <a:xfrm>
-            <a:off x="0" y="577512"/>
-            <a:ext cx="8596668" cy="1320800"/>
-          </a:xfrm>
-        </p:spPr>
-        <p:txBody>
-          <a:bodyPr/>
-          <a:lstStyle/>
-          <a:p>
-            <a:pPr algn="ctr"/>
-            <a:r>
-              <a:rPr lang="fr-FR" dirty="0"/>
-              <a:t>b) Simulation : estimation du temps de parcours</a:t>
-            </a:r>
-          </a:p>
-        </p:txBody>
-      </p:sp>
-      <p:pic>
-        <p:nvPicPr>
-          <p:cNvPr id="4098" name="Picture 2">
-            <a:extLst>
-              <a:ext uri="{FF2B5EF4-FFF2-40B4-BE49-F238E27FC236}">
-                <a16:creationId xmlns:a16="http://schemas.microsoft.com/office/drawing/2014/main" id="{8BD04069-F990-489E-B01A-30B5EACBF7B0}"/>
-              </a:ext>
-            </a:extLst>
-          </p:cNvPr>
-          <p:cNvPicPr>
-            <a:picLocks noChangeAspect="1" noChangeArrowheads="1"/>
-          </p:cNvPicPr>
-          <p:nvPr/>
-        </p:nvPicPr>
-        <p:blipFill>
-          <a:blip r:embed="rId3">
-            <a:extLst>
-              <a:ext uri="{28A0092B-C50C-407E-A947-70E740481C1C}">
-                <a14:useLocalDpi xmlns:a14="http://schemas.microsoft.com/office/drawing/2010/main" val="0"/>
-              </a:ext>
-            </a:extLst>
-          </a:blip>
-          <a:srcRect/>
           <a:stretch>
             <a:fillRect/>
           </a:stretch>
         </p:blipFill>
-        <p:spPr bwMode="auto">
-          <a:xfrm>
-            <a:off x="1270477" y="2164316"/>
-            <a:ext cx="4281873" cy="3224842"/>
+        <p:spPr>
+          <a:xfrm>
+            <a:off x="3589040" y="3296959"/>
+            <a:ext cx="3936150" cy="797543"/>
           </a:xfrm>
           <a:prstGeom prst="rect">
             <a:avLst/>
           </a:prstGeom>
-          <a:noFill/>
-          <a:extLst>
-            <a:ext uri="{909E8E84-426E-40DD-AFC4-6F175D3DCCD1}">
-              <a14:hiddenFill xmlns:a14="http://schemas.microsoft.com/office/drawing/2010/main">
-                <a:solidFill>
-                  <a:srgbClr val="FFFFFF"/>
-                </a:solidFill>
-              </a14:hiddenFill>
-            </a:ext>
-          </a:extLst>
         </p:spPr>
       </p:pic>
-      <p:sp>
-        <p:nvSpPr>
-          <p:cNvPr id="10" name="ZoneTexte 9">
-            <a:extLst>
-              <a:ext uri="{FF2B5EF4-FFF2-40B4-BE49-F238E27FC236}">
-                <a16:creationId xmlns:a16="http://schemas.microsoft.com/office/drawing/2014/main" id="{01ABE1BA-29E6-408B-BAD3-CC9414ACBA1F}"/>
-              </a:ext>
-            </a:extLst>
-          </p:cNvPr>
-          <p:cNvSpPr txBox="1"/>
-          <p:nvPr/>
-        </p:nvSpPr>
-        <p:spPr>
-          <a:xfrm>
-            <a:off x="5412800" y="4993611"/>
-            <a:ext cx="4612613" cy="1477328"/>
-          </a:xfrm>
-          <a:prstGeom prst="rect">
-            <a:avLst/>
-          </a:prstGeom>
-          <a:noFill/>
-        </p:spPr>
-        <p:txBody>
-          <a:bodyPr wrap="square">
-            <a:spAutoFit/>
-          </a:bodyPr>
-          <a:lstStyle/>
-          <a:p>
-            <a:pPr algn="ctr" rtl="0">
-              <a:spcBef>
-                <a:spcPts val="0"/>
-              </a:spcBef>
-              <a:spcAft>
-                <a:spcPts val="0"/>
-              </a:spcAft>
-            </a:pPr>
-            <a:r>
-              <a:rPr lang="fr-FR" sz="1800" b="1" i="0" u="none" strike="noStrike" dirty="0">
-                <a:solidFill>
-                  <a:srgbClr val="000000"/>
-                </a:solidFill>
-                <a:effectLst/>
-                <a:latin typeface="Roboto" panose="02000000000000000000" pitchFamily="2" charset="0"/>
-              </a:rPr>
-              <a:t>Front d’onde après traversé de la cuve</a:t>
-            </a:r>
-            <a:r>
-              <a:rPr lang="fr-FR" sz="1800" b="0" i="0" u="none" strike="noStrike" dirty="0">
-                <a:solidFill>
-                  <a:srgbClr val="000000"/>
-                </a:solidFill>
-                <a:effectLst/>
-                <a:latin typeface="Roboto" panose="02000000000000000000" pitchFamily="2" charset="0"/>
-              </a:rPr>
-              <a:t> </a:t>
-            </a:r>
-            <a:endParaRPr lang="fr-FR" b="0" dirty="0">
-              <a:effectLst/>
-            </a:endParaRPr>
-          </a:p>
-          <a:p>
-            <a:pPr algn="ctr" rtl="0">
-              <a:spcBef>
-                <a:spcPts val="0"/>
-              </a:spcBef>
-              <a:spcAft>
-                <a:spcPts val="0"/>
-              </a:spcAft>
-            </a:pPr>
-            <a:r>
-              <a:rPr lang="fr-FR" sz="1800" b="0" i="0" u="none" strike="noStrike" dirty="0">
-                <a:solidFill>
-                  <a:srgbClr val="000000"/>
-                </a:solidFill>
-                <a:effectLst/>
-                <a:latin typeface="Roboto" panose="02000000000000000000" pitchFamily="2" charset="0"/>
-              </a:rPr>
-              <a:t>(décalage en fonction du temps</a:t>
-            </a:r>
-            <a:r>
-              <a:rPr lang="fr-FR" dirty="0">
-                <a:solidFill>
-                  <a:srgbClr val="000000"/>
-                </a:solidFill>
-                <a:latin typeface="Roboto" panose="02000000000000000000" pitchFamily="2" charset="0"/>
-              </a:rPr>
-              <a:t>) </a:t>
-            </a:r>
-          </a:p>
-          <a:p>
-            <a:pPr algn="ctr" rtl="0">
-              <a:spcBef>
-                <a:spcPts val="0"/>
-              </a:spcBef>
-              <a:spcAft>
-                <a:spcPts val="0"/>
-              </a:spcAft>
-            </a:pPr>
-            <a:r>
-              <a:rPr lang="fr-FR" dirty="0">
-                <a:solidFill>
-                  <a:srgbClr val="000000"/>
-                </a:solidFill>
-                <a:latin typeface="Roboto" panose="02000000000000000000" pitchFamily="2" charset="0"/>
-              </a:rPr>
-              <a:t>Rectangle </a:t>
-            </a:r>
-            <a:r>
-              <a:rPr lang="fr-FR" dirty="0"/>
-              <a:t>rouge pour ce qui </a:t>
-            </a:r>
-          </a:p>
-          <a:p>
-            <a:pPr algn="ctr" rtl="0">
-              <a:spcBef>
-                <a:spcPts val="0"/>
-              </a:spcBef>
-              <a:spcAft>
-                <a:spcPts val="0"/>
-              </a:spcAft>
-            </a:pPr>
-            <a:r>
-              <a:rPr lang="fr-FR" dirty="0"/>
-              <a:t>nous intéresse</a:t>
-            </a:r>
-            <a:br>
-              <a:rPr lang="fr-FR" dirty="0"/>
-            </a:br>
-            <a:endParaRPr lang="fr-FR" dirty="0"/>
-          </a:p>
-        </p:txBody>
-      </p:sp>
-      <p:sp>
-        <p:nvSpPr>
-          <p:cNvPr id="14" name="ZoneTexte 13">
-            <a:extLst>
-              <a:ext uri="{FF2B5EF4-FFF2-40B4-BE49-F238E27FC236}">
-                <a16:creationId xmlns:a16="http://schemas.microsoft.com/office/drawing/2014/main" id="{EB2B03C1-BB7A-420F-B26F-F4E91329DBA1}"/>
-              </a:ext>
-            </a:extLst>
-          </p:cNvPr>
-          <p:cNvSpPr txBox="1"/>
-          <p:nvPr/>
-        </p:nvSpPr>
-        <p:spPr>
-          <a:xfrm>
-            <a:off x="4822281" y="1645765"/>
-            <a:ext cx="6099242" cy="923330"/>
-          </a:xfrm>
-          <a:prstGeom prst="rect">
-            <a:avLst/>
-          </a:prstGeom>
-          <a:noFill/>
-        </p:spPr>
-        <p:txBody>
-          <a:bodyPr wrap="square">
-            <a:spAutoFit/>
-          </a:bodyPr>
-          <a:lstStyle/>
-          <a:p>
-            <a:pPr algn="ctr" rtl="0">
-              <a:spcBef>
-                <a:spcPts val="0"/>
-              </a:spcBef>
-              <a:spcAft>
-                <a:spcPts val="0"/>
-              </a:spcAft>
-            </a:pPr>
-            <a:r>
-              <a:rPr lang="fr-FR" sz="1800" b="1" i="0" u="none" strike="noStrike" dirty="0">
-                <a:solidFill>
-                  <a:srgbClr val="000000"/>
-                </a:solidFill>
-                <a:effectLst/>
-                <a:latin typeface="Roboto" panose="02000000000000000000" pitchFamily="2" charset="0"/>
-              </a:rPr>
-              <a:t>Simulation des inhomogénéités</a:t>
-            </a:r>
-            <a:endParaRPr lang="fr-FR" b="0" dirty="0">
-              <a:effectLst/>
-            </a:endParaRPr>
-          </a:p>
-          <a:p>
-            <a:br>
-              <a:rPr lang="fr-FR" dirty="0"/>
-            </a:br>
-            <a:endParaRPr lang="fr-FR" dirty="0"/>
-          </a:p>
-        </p:txBody>
-      </p:sp>
-      <p:cxnSp>
-        <p:nvCxnSpPr>
-          <p:cNvPr id="4" name="Connecteur droit avec flèche 3">
-            <a:extLst>
-              <a:ext uri="{FF2B5EF4-FFF2-40B4-BE49-F238E27FC236}">
-                <a16:creationId xmlns:a16="http://schemas.microsoft.com/office/drawing/2014/main" id="{F4C491B0-E35B-4F94-A991-F0C6E501C36D}"/>
-              </a:ext>
-            </a:extLst>
-          </p:cNvPr>
-          <p:cNvCxnSpPr>
-            <a:cxnSpLocks/>
-          </p:cNvCxnSpPr>
-          <p:nvPr/>
-        </p:nvCxnSpPr>
-        <p:spPr>
-          <a:xfrm>
-            <a:off x="184826" y="2481005"/>
-            <a:ext cx="904672" cy="0"/>
-          </a:xfrm>
-          <a:prstGeom prst="straightConnector1">
-            <a:avLst/>
-          </a:prstGeom>
-          <a:ln>
-            <a:tailEnd type="triangle"/>
-          </a:ln>
-        </p:spPr>
-        <p:style>
-          <a:lnRef idx="2">
-            <a:schemeClr val="dk1"/>
-          </a:lnRef>
-          <a:fillRef idx="0">
-            <a:schemeClr val="dk1"/>
-          </a:fillRef>
-          <a:effectRef idx="1">
-            <a:schemeClr val="dk1"/>
-          </a:effectRef>
-          <a:fontRef idx="minor">
-            <a:schemeClr val="tx1"/>
-          </a:fontRef>
-        </p:style>
-      </p:cxnSp>
-      <p:cxnSp>
-        <p:nvCxnSpPr>
-          <p:cNvPr id="12" name="Connecteur droit avec flèche 11">
-            <a:extLst>
-              <a:ext uri="{FF2B5EF4-FFF2-40B4-BE49-F238E27FC236}">
-                <a16:creationId xmlns:a16="http://schemas.microsoft.com/office/drawing/2014/main" id="{94E528F4-DCFF-4522-8C7B-FA163DE5D016}"/>
-              </a:ext>
-            </a:extLst>
-          </p:cNvPr>
-          <p:cNvCxnSpPr>
-            <a:cxnSpLocks/>
-          </p:cNvCxnSpPr>
-          <p:nvPr/>
-        </p:nvCxnSpPr>
-        <p:spPr>
-          <a:xfrm>
-            <a:off x="197437" y="4573901"/>
-            <a:ext cx="904672" cy="0"/>
-          </a:xfrm>
-          <a:prstGeom prst="straightConnector1">
-            <a:avLst/>
-          </a:prstGeom>
-          <a:ln>
-            <a:tailEnd type="triangle"/>
-          </a:ln>
-        </p:spPr>
-        <p:style>
-          <a:lnRef idx="2">
-            <a:schemeClr val="dk1"/>
-          </a:lnRef>
-          <a:fillRef idx="0">
-            <a:schemeClr val="dk1"/>
-          </a:fillRef>
-          <a:effectRef idx="1">
-            <a:schemeClr val="dk1"/>
-          </a:effectRef>
-          <a:fontRef idx="minor">
-            <a:schemeClr val="tx1"/>
-          </a:fontRef>
-        </p:style>
-      </p:cxnSp>
-      <p:cxnSp>
-        <p:nvCxnSpPr>
-          <p:cNvPr id="13" name="Connecteur droit avec flèche 12">
-            <a:extLst>
-              <a:ext uri="{FF2B5EF4-FFF2-40B4-BE49-F238E27FC236}">
-                <a16:creationId xmlns:a16="http://schemas.microsoft.com/office/drawing/2014/main" id="{B2636701-50CB-4925-B2C8-BE24D92FD6F2}"/>
-              </a:ext>
-            </a:extLst>
-          </p:cNvPr>
-          <p:cNvCxnSpPr>
-            <a:cxnSpLocks/>
-          </p:cNvCxnSpPr>
-          <p:nvPr/>
-        </p:nvCxnSpPr>
-        <p:spPr>
-          <a:xfrm>
-            <a:off x="184826" y="2973873"/>
-            <a:ext cx="904672" cy="0"/>
-          </a:xfrm>
-          <a:prstGeom prst="straightConnector1">
-            <a:avLst/>
-          </a:prstGeom>
-          <a:ln>
-            <a:tailEnd type="triangle"/>
-          </a:ln>
-        </p:spPr>
-        <p:style>
-          <a:lnRef idx="2">
-            <a:schemeClr val="dk1"/>
-          </a:lnRef>
-          <a:fillRef idx="0">
-            <a:schemeClr val="dk1"/>
-          </a:fillRef>
-          <a:effectRef idx="1">
-            <a:schemeClr val="dk1"/>
-          </a:effectRef>
-          <a:fontRef idx="minor">
-            <a:schemeClr val="tx1"/>
-          </a:fontRef>
-        </p:style>
-      </p:cxnSp>
-      <p:cxnSp>
-        <p:nvCxnSpPr>
-          <p:cNvPr id="15" name="Connecteur droit avec flèche 14">
-            <a:extLst>
-              <a:ext uri="{FF2B5EF4-FFF2-40B4-BE49-F238E27FC236}">
-                <a16:creationId xmlns:a16="http://schemas.microsoft.com/office/drawing/2014/main" id="{CED1DB18-CA05-48EB-A910-D46C1438EF0E}"/>
-              </a:ext>
-            </a:extLst>
-          </p:cNvPr>
-          <p:cNvCxnSpPr>
-            <a:cxnSpLocks/>
-          </p:cNvCxnSpPr>
-          <p:nvPr/>
-        </p:nvCxnSpPr>
-        <p:spPr>
-          <a:xfrm>
-            <a:off x="184826" y="5035376"/>
-            <a:ext cx="904672" cy="0"/>
-          </a:xfrm>
-          <a:prstGeom prst="straightConnector1">
-            <a:avLst/>
-          </a:prstGeom>
-          <a:ln>
-            <a:tailEnd type="triangle"/>
-          </a:ln>
-        </p:spPr>
-        <p:style>
-          <a:lnRef idx="2">
-            <a:schemeClr val="dk1"/>
-          </a:lnRef>
-          <a:fillRef idx="0">
-            <a:schemeClr val="dk1"/>
-          </a:fillRef>
-          <a:effectRef idx="1">
-            <a:schemeClr val="dk1"/>
-          </a:effectRef>
-          <a:fontRef idx="minor">
-            <a:schemeClr val="tx1"/>
-          </a:fontRef>
-        </p:style>
-      </p:cxnSp>
-      <p:cxnSp>
-        <p:nvCxnSpPr>
-          <p:cNvPr id="16" name="Connecteur droit avec flèche 15">
-            <a:extLst>
-              <a:ext uri="{FF2B5EF4-FFF2-40B4-BE49-F238E27FC236}">
-                <a16:creationId xmlns:a16="http://schemas.microsoft.com/office/drawing/2014/main" id="{DCE66910-17AA-4E24-AA61-4EFB40B09DEB}"/>
-              </a:ext>
-            </a:extLst>
-          </p:cNvPr>
-          <p:cNvCxnSpPr>
-            <a:cxnSpLocks/>
-          </p:cNvCxnSpPr>
-          <p:nvPr/>
-        </p:nvCxnSpPr>
-        <p:spPr>
-          <a:xfrm>
-            <a:off x="184826" y="3479711"/>
-            <a:ext cx="904672" cy="0"/>
-          </a:xfrm>
-          <a:prstGeom prst="straightConnector1">
-            <a:avLst/>
-          </a:prstGeom>
-          <a:ln>
-            <a:tailEnd type="triangle"/>
-          </a:ln>
-        </p:spPr>
-        <p:style>
-          <a:lnRef idx="2">
-            <a:schemeClr val="dk1"/>
-          </a:lnRef>
-          <a:fillRef idx="0">
-            <a:schemeClr val="dk1"/>
-          </a:fillRef>
-          <a:effectRef idx="1">
-            <a:schemeClr val="dk1"/>
-          </a:effectRef>
-          <a:fontRef idx="minor">
-            <a:schemeClr val="tx1"/>
-          </a:fontRef>
-        </p:style>
-      </p:cxnSp>
-      <p:cxnSp>
-        <p:nvCxnSpPr>
-          <p:cNvPr id="18" name="Connecteur droit avec flèche 17">
-            <a:extLst>
-              <a:ext uri="{FF2B5EF4-FFF2-40B4-BE49-F238E27FC236}">
-                <a16:creationId xmlns:a16="http://schemas.microsoft.com/office/drawing/2014/main" id="{81CE1A96-FDCE-4A1C-A01B-00803CCD3408}"/>
-              </a:ext>
-            </a:extLst>
-          </p:cNvPr>
-          <p:cNvCxnSpPr>
-            <a:cxnSpLocks/>
-          </p:cNvCxnSpPr>
-          <p:nvPr/>
-        </p:nvCxnSpPr>
-        <p:spPr>
-          <a:xfrm>
-            <a:off x="197437" y="4043916"/>
-            <a:ext cx="904672" cy="0"/>
-          </a:xfrm>
-          <a:prstGeom prst="straightConnector1">
-            <a:avLst/>
-          </a:prstGeom>
-          <a:ln>
-            <a:tailEnd type="triangle"/>
-          </a:ln>
-        </p:spPr>
-        <p:style>
-          <a:lnRef idx="2">
-            <a:schemeClr val="dk1"/>
-          </a:lnRef>
-          <a:fillRef idx="0">
-            <a:schemeClr val="dk1"/>
-          </a:fillRef>
-          <a:effectRef idx="1">
-            <a:schemeClr val="dk1"/>
-          </a:effectRef>
-          <a:fontRef idx="minor">
-            <a:schemeClr val="tx1"/>
-          </a:fontRef>
-        </p:style>
-      </p:cxnSp>
-      <p:sp>
-        <p:nvSpPr>
-          <p:cNvPr id="6" name="ZoneTexte 5">
-            <a:extLst>
-              <a:ext uri="{FF2B5EF4-FFF2-40B4-BE49-F238E27FC236}">
-                <a16:creationId xmlns:a16="http://schemas.microsoft.com/office/drawing/2014/main" id="{AB1EE0DC-8192-42DF-B484-F7E391ADD307}"/>
-              </a:ext>
-            </a:extLst>
-          </p:cNvPr>
-          <p:cNvSpPr txBox="1"/>
-          <p:nvPr/>
-        </p:nvSpPr>
-        <p:spPr>
-          <a:xfrm>
-            <a:off x="0" y="1762896"/>
-            <a:ext cx="2016899" cy="369332"/>
-          </a:xfrm>
-          <a:prstGeom prst="rect">
-            <a:avLst/>
-          </a:prstGeom>
-          <a:noFill/>
-        </p:spPr>
-        <p:txBody>
-          <a:bodyPr wrap="none" rtlCol="0">
-            <a:spAutoFit/>
-          </a:bodyPr>
-          <a:lstStyle/>
-          <a:p>
-            <a:r>
-              <a:rPr lang="fr-FR" dirty="0"/>
-              <a:t>Lumière en phase</a:t>
-            </a:r>
-          </a:p>
-        </p:txBody>
-      </p:sp>
-      <p:sp>
-        <p:nvSpPr>
-          <p:cNvPr id="3" name="Rectangle 2">
-            <a:extLst>
-              <a:ext uri="{FF2B5EF4-FFF2-40B4-BE49-F238E27FC236}">
-                <a16:creationId xmlns:a16="http://schemas.microsoft.com/office/drawing/2014/main" id="{A6EC08AF-08A1-5F14-A178-15F7E872CBFC}"/>
-              </a:ext>
-            </a:extLst>
-          </p:cNvPr>
-          <p:cNvSpPr/>
-          <p:nvPr/>
-        </p:nvSpPr>
-        <p:spPr>
-          <a:xfrm>
-            <a:off x="1292087" y="2464342"/>
-            <a:ext cx="4247652" cy="2624790"/>
-          </a:xfrm>
-          <a:prstGeom prst="rect">
-            <a:avLst/>
-          </a:prstGeom>
-          <a:noFill/>
-          <a:ln w="38100">
-            <a:solidFill>
-              <a:srgbClr val="FF0000"/>
-            </a:solidFill>
-          </a:ln>
-        </p:spPr>
-        <p:style>
-          <a:lnRef idx="2">
-            <a:schemeClr val="accent1">
-              <a:shade val="50000"/>
-            </a:schemeClr>
-          </a:lnRef>
-          <a:fillRef idx="1">
-            <a:schemeClr val="accent1"/>
-          </a:fillRef>
-          <a:effectRef idx="0">
-            <a:schemeClr val="accent1"/>
-          </a:effectRef>
-          <a:fontRef idx="minor">
-            <a:schemeClr val="lt1"/>
-          </a:fontRef>
-        </p:style>
-        <p:txBody>
-          <a:bodyPr rtlCol="0" anchor="ctr"/>
-          <a:lstStyle/>
-          <a:p>
-            <a:pPr algn="ctr"/>
-            <a:endParaRPr lang="fr-FR"/>
-          </a:p>
-        </p:txBody>
-      </p:sp>
-      <p:sp>
-        <p:nvSpPr>
-          <p:cNvPr id="7" name="Rectangle 6">
-            <a:extLst>
-              <a:ext uri="{FF2B5EF4-FFF2-40B4-BE49-F238E27FC236}">
-                <a16:creationId xmlns:a16="http://schemas.microsoft.com/office/drawing/2014/main" id="{1784BD82-72A9-0EB1-A846-DCA36B0E988E}"/>
-              </a:ext>
-            </a:extLst>
-          </p:cNvPr>
-          <p:cNvSpPr/>
-          <p:nvPr/>
-        </p:nvSpPr>
-        <p:spPr>
-          <a:xfrm>
-            <a:off x="6108968" y="2746254"/>
-            <a:ext cx="3220278" cy="1938130"/>
-          </a:xfrm>
-          <a:prstGeom prst="rect">
-            <a:avLst/>
-          </a:prstGeom>
-          <a:noFill/>
-          <a:ln w="38100">
-            <a:solidFill>
-              <a:srgbClr val="FF0000"/>
-            </a:solidFill>
-          </a:ln>
-        </p:spPr>
-        <p:style>
-          <a:lnRef idx="2">
-            <a:schemeClr val="accent1">
-              <a:shade val="50000"/>
-            </a:schemeClr>
-          </a:lnRef>
-          <a:fillRef idx="1">
-            <a:schemeClr val="accent1"/>
-          </a:fillRef>
-          <a:effectRef idx="0">
-            <a:schemeClr val="accent1"/>
-          </a:effectRef>
-          <a:fontRef idx="minor">
-            <a:schemeClr val="lt1"/>
-          </a:fontRef>
-        </p:style>
-        <p:txBody>
-          <a:bodyPr rtlCol="0" anchor="ctr"/>
-          <a:lstStyle/>
-          <a:p>
-            <a:pPr algn="ctr"/>
-            <a:endParaRPr lang="fr-FR"/>
-          </a:p>
-        </p:txBody>
-      </p:sp>
     </p:spTree>
     <p:extLst>
       <p:ext uri="{BB962C8B-B14F-4D97-AF65-F5344CB8AC3E}">
-        <p14:creationId xmlns:p14="http://schemas.microsoft.com/office/powerpoint/2010/main" val="2914263296"/>
+        <p14:creationId xmlns:p14="http://schemas.microsoft.com/office/powerpoint/2010/main" val="535398735"/>
       </p:ext>
     </p:extLst>
   </p:cSld>

</xml_diff>